<commit_message>
'Presentation Slide - Added'
</commit_message>
<xml_diff>
--- a/UI - UX Prototyping.pptx
+++ b/UI - UX Prototyping.pptx
@@ -121,7 +121,7 @@
   </p:defaultTextStyle>
   <p:extLst>
     <p:ext uri="{EFAFB233-063F-42B5-8137-9DF3F51BA10A}">
-      <p15:sldGuideLst xmlns="" xmlns:p15="http://schemas.microsoft.com/office/powerpoint/2012/main">
+      <p15:sldGuideLst xmlns:p15="http://schemas.microsoft.com/office/powerpoint/2012/main" xmlns="">
         <p15:guide id="1" orient="horz" pos="2712" userDrawn="1">
           <p15:clr>
             <a:srgbClr val="A4A3A4"/>
@@ -175,7 +175,7 @@
       </p15:sldGuideLst>
     </p:ext>
     <p:ext uri="{2D200454-40CA-4A62-9FC3-DE9A4176ACB9}">
-      <p15:notesGuideLst xmlns="" xmlns:p15="http://schemas.microsoft.com/office/powerpoint/2012/main"/>
+      <p15:notesGuideLst xmlns:p15="http://schemas.microsoft.com/office/powerpoint/2012/main" xmlns=""/>
     </p:ext>
   </p:extLst>
 </p:presentation>
@@ -713,7 +713,7 @@
           <p:cNvPr id="8" name="Picture Placeholder 7">
             <a:extLst>
               <a:ext uri="{FF2B5EF4-FFF2-40B4-BE49-F238E27FC236}">
-                <a16:creationId xmlns="" xmlns:a16="http://schemas.microsoft.com/office/drawing/2014/main" id="{CB010704-C763-4C45-8DA1-4B9352C2B743}"/>
+                <a16:creationId xmlns:a16="http://schemas.microsoft.com/office/drawing/2014/main" xmlns="" id="{CB010704-C763-4C45-8DA1-4B9352C2B743}"/>
               </a:ext>
             </a:extLst>
           </p:cNvPr>
@@ -791,7 +791,7 @@
           <p:cNvPr id="7" name="Picture Placeholder 6">
             <a:extLst>
               <a:ext uri="{FF2B5EF4-FFF2-40B4-BE49-F238E27FC236}">
-                <a16:creationId xmlns="" xmlns:a16="http://schemas.microsoft.com/office/drawing/2014/main" id="{4C2FC3F1-37E0-4E62-8FE9-9483277602D1}"/>
+                <a16:creationId xmlns:a16="http://schemas.microsoft.com/office/drawing/2014/main" xmlns="" id="{4C2FC3F1-37E0-4E62-8FE9-9483277602D1}"/>
               </a:ext>
             </a:extLst>
           </p:cNvPr>
@@ -899,7 +899,7 @@
           <p:cNvPr id="5" name="Picture Placeholder 4">
             <a:extLst>
               <a:ext uri="{FF2B5EF4-FFF2-40B4-BE49-F238E27FC236}">
-                <a16:creationId xmlns="" xmlns:a16="http://schemas.microsoft.com/office/drawing/2014/main" id="{AD013339-45C4-49AB-91BD-173EE08B5DB5}"/>
+                <a16:creationId xmlns:a16="http://schemas.microsoft.com/office/drawing/2014/main" xmlns="" id="{AD013339-45C4-49AB-91BD-173EE08B5DB5}"/>
               </a:ext>
             </a:extLst>
           </p:cNvPr>
@@ -1007,7 +1007,7 @@
           <p:cNvPr id="5" name="Picture Placeholder 4">
             <a:extLst>
               <a:ext uri="{FF2B5EF4-FFF2-40B4-BE49-F238E27FC236}">
-                <a16:creationId xmlns="" xmlns:a16="http://schemas.microsoft.com/office/drawing/2014/main" id="{8A183238-BB9B-416B-8BB6-E8D6D044F5DA}"/>
+                <a16:creationId xmlns:a16="http://schemas.microsoft.com/office/drawing/2014/main" xmlns="" id="{8A183238-BB9B-416B-8BB6-E8D6D044F5DA}"/>
               </a:ext>
             </a:extLst>
           </p:cNvPr>
@@ -1115,7 +1115,7 @@
           <p:cNvPr id="6" name="Picture Placeholder 5">
             <a:extLst>
               <a:ext uri="{FF2B5EF4-FFF2-40B4-BE49-F238E27FC236}">
-                <a16:creationId xmlns="" xmlns:a16="http://schemas.microsoft.com/office/drawing/2014/main" id="{A0519ED0-9BB5-46FF-AB04-20414A1D8298}"/>
+                <a16:creationId xmlns:a16="http://schemas.microsoft.com/office/drawing/2014/main" xmlns="" id="{A0519ED0-9BB5-46FF-AB04-20414A1D8298}"/>
               </a:ext>
             </a:extLst>
           </p:cNvPr>
@@ -1193,7 +1193,7 @@
           <p:cNvPr id="9" name="Picture Placeholder 8">
             <a:extLst>
               <a:ext uri="{FF2B5EF4-FFF2-40B4-BE49-F238E27FC236}">
-                <a16:creationId xmlns="" xmlns:a16="http://schemas.microsoft.com/office/drawing/2014/main" id="{F65DB015-8BF0-4C6E-811B-F59C4209EB6E}"/>
+                <a16:creationId xmlns:a16="http://schemas.microsoft.com/office/drawing/2014/main" xmlns="" id="{F65DB015-8BF0-4C6E-811B-F59C4209EB6E}"/>
               </a:ext>
             </a:extLst>
           </p:cNvPr>
@@ -1301,7 +1301,7 @@
           <p:cNvPr id="8" name="Picture Placeholder 7">
             <a:extLst>
               <a:ext uri="{FF2B5EF4-FFF2-40B4-BE49-F238E27FC236}">
-                <a16:creationId xmlns="" xmlns:a16="http://schemas.microsoft.com/office/drawing/2014/main" id="{BCF1CD7E-9839-4FC2-8E30-81ED89F90FC3}"/>
+                <a16:creationId xmlns:a16="http://schemas.microsoft.com/office/drawing/2014/main" xmlns="" id="{BCF1CD7E-9839-4FC2-8E30-81ED89F90FC3}"/>
               </a:ext>
             </a:extLst>
           </p:cNvPr>
@@ -1379,7 +1379,7 @@
           <p:cNvPr id="7" name="Picture Placeholder 6">
             <a:extLst>
               <a:ext uri="{FF2B5EF4-FFF2-40B4-BE49-F238E27FC236}">
-                <a16:creationId xmlns="" xmlns:a16="http://schemas.microsoft.com/office/drawing/2014/main" id="{0F7C1BDD-E495-4F6C-B730-A0C9C0E4E08C}"/>
+                <a16:creationId xmlns:a16="http://schemas.microsoft.com/office/drawing/2014/main" xmlns="" id="{0F7C1BDD-E495-4F6C-B730-A0C9C0E4E08C}"/>
               </a:ext>
             </a:extLst>
           </p:cNvPr>
@@ -1503,7 +1503,7 @@
           <p:cNvPr id="5" name="Picture Placeholder 4">
             <a:extLst>
               <a:ext uri="{FF2B5EF4-FFF2-40B4-BE49-F238E27FC236}">
-                <a16:creationId xmlns="" xmlns:a16="http://schemas.microsoft.com/office/drawing/2014/main" id="{2C2B9BB1-ED03-4D05-AEBF-0829C379F65A}"/>
+                <a16:creationId xmlns:a16="http://schemas.microsoft.com/office/drawing/2014/main" xmlns="" id="{2C2B9BB1-ED03-4D05-AEBF-0829C379F65A}"/>
               </a:ext>
             </a:extLst>
           </p:cNvPr>
@@ -1611,7 +1611,7 @@
           <p:cNvPr id="10" name="Picture Placeholder 9">
             <a:extLst>
               <a:ext uri="{FF2B5EF4-FFF2-40B4-BE49-F238E27FC236}">
-                <a16:creationId xmlns="" xmlns:a16="http://schemas.microsoft.com/office/drawing/2014/main" id="{FD32B902-8357-45D5-AB7B-88F1A648D392}"/>
+                <a16:creationId xmlns:a16="http://schemas.microsoft.com/office/drawing/2014/main" xmlns="" id="{FD32B902-8357-45D5-AB7B-88F1A648D392}"/>
               </a:ext>
             </a:extLst>
           </p:cNvPr>
@@ -1689,7 +1689,7 @@
           <p:cNvPr id="11" name="Picture Placeholder 10">
             <a:extLst>
               <a:ext uri="{FF2B5EF4-FFF2-40B4-BE49-F238E27FC236}">
-                <a16:creationId xmlns="" xmlns:a16="http://schemas.microsoft.com/office/drawing/2014/main" id="{AF3294C5-565B-49D9-89B8-D4F76B03864F}"/>
+                <a16:creationId xmlns:a16="http://schemas.microsoft.com/office/drawing/2014/main" xmlns="" id="{AF3294C5-565B-49D9-89B8-D4F76B03864F}"/>
               </a:ext>
             </a:extLst>
           </p:cNvPr>
@@ -1767,7 +1767,7 @@
           <p:cNvPr id="9" name="Picture Placeholder 8">
             <a:extLst>
               <a:ext uri="{FF2B5EF4-FFF2-40B4-BE49-F238E27FC236}">
-                <a16:creationId xmlns="" xmlns:a16="http://schemas.microsoft.com/office/drawing/2014/main" id="{E8FF52FC-5EF7-4B3A-AFD2-3166D347D1AC}"/>
+                <a16:creationId xmlns:a16="http://schemas.microsoft.com/office/drawing/2014/main" xmlns="" id="{E8FF52FC-5EF7-4B3A-AFD2-3166D347D1AC}"/>
               </a:ext>
             </a:extLst>
           </p:cNvPr>
@@ -1875,7 +1875,7 @@
           <p:cNvPr id="5" name="Picture Placeholder 4">
             <a:extLst>
               <a:ext uri="{FF2B5EF4-FFF2-40B4-BE49-F238E27FC236}">
-                <a16:creationId xmlns="" xmlns:a16="http://schemas.microsoft.com/office/drawing/2014/main" id="{1D2563AD-3DAB-4135-BE28-DE289BB2F36B}"/>
+                <a16:creationId xmlns:a16="http://schemas.microsoft.com/office/drawing/2014/main" xmlns="" id="{1D2563AD-3DAB-4135-BE28-DE289BB2F36B}"/>
               </a:ext>
             </a:extLst>
           </p:cNvPr>
@@ -1983,7 +1983,7 @@
           <p:cNvPr id="5" name="Picture Placeholder 4">
             <a:extLst>
               <a:ext uri="{FF2B5EF4-FFF2-40B4-BE49-F238E27FC236}">
-                <a16:creationId xmlns="" xmlns:a16="http://schemas.microsoft.com/office/drawing/2014/main" id="{5048E5BA-2E75-45C0-93CD-A9BBE23DF046}"/>
+                <a16:creationId xmlns:a16="http://schemas.microsoft.com/office/drawing/2014/main" xmlns="" id="{5048E5BA-2E75-45C0-93CD-A9BBE23DF046}"/>
               </a:ext>
             </a:extLst>
           </p:cNvPr>
@@ -2091,7 +2091,7 @@
           <p:cNvPr id="8" name="Picture Placeholder 7">
             <a:extLst>
               <a:ext uri="{FF2B5EF4-FFF2-40B4-BE49-F238E27FC236}">
-                <a16:creationId xmlns="" xmlns:a16="http://schemas.microsoft.com/office/drawing/2014/main" id="{A053ED8B-69E3-423B-80EF-E81612F7B4FD}"/>
+                <a16:creationId xmlns:a16="http://schemas.microsoft.com/office/drawing/2014/main" xmlns="" id="{A053ED8B-69E3-423B-80EF-E81612F7B4FD}"/>
               </a:ext>
             </a:extLst>
           </p:cNvPr>
@@ -2169,7 +2169,7 @@
           <p:cNvPr id="7" name="Picture Placeholder 6">
             <a:extLst>
               <a:ext uri="{FF2B5EF4-FFF2-40B4-BE49-F238E27FC236}">
-                <a16:creationId xmlns="" xmlns:a16="http://schemas.microsoft.com/office/drawing/2014/main" id="{68A3A85D-E95A-491A-9742-F4E3F07F841D}"/>
+                <a16:creationId xmlns:a16="http://schemas.microsoft.com/office/drawing/2014/main" xmlns="" id="{68A3A85D-E95A-491A-9742-F4E3F07F841D}"/>
               </a:ext>
             </a:extLst>
           </p:cNvPr>
@@ -2277,7 +2277,7 @@
           <p:cNvPr id="3" name="Rectangle 2">
             <a:extLst>
               <a:ext uri="{FF2B5EF4-FFF2-40B4-BE49-F238E27FC236}">
-                <a16:creationId xmlns="" xmlns:a16="http://schemas.microsoft.com/office/drawing/2014/main" id="{2FEBF1AA-5511-4664-AC94-8FF51B1C5EA9}"/>
+                <a16:creationId xmlns:a16="http://schemas.microsoft.com/office/drawing/2014/main" xmlns="" id="{2FEBF1AA-5511-4664-AC94-8FF51B1C5EA9}"/>
               </a:ext>
             </a:extLst>
           </p:cNvPr>
@@ -2362,7 +2362,7 @@
           <p:cNvPr id="5" name="Picture Placeholder 4">
             <a:extLst>
               <a:ext uri="{FF2B5EF4-FFF2-40B4-BE49-F238E27FC236}">
-                <a16:creationId xmlns="" xmlns:a16="http://schemas.microsoft.com/office/drawing/2014/main" id="{0D875F4F-8448-414E-BCCD-435DBA5BAAA7}"/>
+                <a16:creationId xmlns:a16="http://schemas.microsoft.com/office/drawing/2014/main" xmlns="" id="{0D875F4F-8448-414E-BCCD-435DBA5BAAA7}"/>
               </a:ext>
             </a:extLst>
           </p:cNvPr>
@@ -2470,7 +2470,7 @@
           <p:cNvPr id="5" name="Picture Placeholder 4">
             <a:extLst>
               <a:ext uri="{FF2B5EF4-FFF2-40B4-BE49-F238E27FC236}">
-                <a16:creationId xmlns="" xmlns:a16="http://schemas.microsoft.com/office/drawing/2014/main" id="{E309FE5C-BE90-4232-93A6-70FA2A0EE361}"/>
+                <a16:creationId xmlns:a16="http://schemas.microsoft.com/office/drawing/2014/main" xmlns="" id="{E309FE5C-BE90-4232-93A6-70FA2A0EE361}"/>
               </a:ext>
             </a:extLst>
           </p:cNvPr>
@@ -2594,7 +2594,7 @@
           <p:cNvPr id="5" name="Picture Placeholder 4">
             <a:extLst>
               <a:ext uri="{FF2B5EF4-FFF2-40B4-BE49-F238E27FC236}">
-                <a16:creationId xmlns="" xmlns:a16="http://schemas.microsoft.com/office/drawing/2014/main" id="{F6CA396B-9769-468C-8C3F-25BD3DF02F78}"/>
+                <a16:creationId xmlns:a16="http://schemas.microsoft.com/office/drawing/2014/main" xmlns="" id="{F6CA396B-9769-468C-8C3F-25BD3DF02F78}"/>
               </a:ext>
             </a:extLst>
           </p:cNvPr>
@@ -2702,7 +2702,7 @@
           <p:cNvPr id="5" name="Picture Placeholder 4">
             <a:extLst>
               <a:ext uri="{FF2B5EF4-FFF2-40B4-BE49-F238E27FC236}">
-                <a16:creationId xmlns="" xmlns:a16="http://schemas.microsoft.com/office/drawing/2014/main" id="{490F9CE3-2510-4E7E-ADE1-08EBF53A42E5}"/>
+                <a16:creationId xmlns:a16="http://schemas.microsoft.com/office/drawing/2014/main" xmlns="" id="{490F9CE3-2510-4E7E-ADE1-08EBF53A42E5}"/>
               </a:ext>
             </a:extLst>
           </p:cNvPr>
@@ -2810,7 +2810,7 @@
           <p:cNvPr id="11" name="Picture Placeholder 10">
             <a:extLst>
               <a:ext uri="{FF2B5EF4-FFF2-40B4-BE49-F238E27FC236}">
-                <a16:creationId xmlns="" xmlns:a16="http://schemas.microsoft.com/office/drawing/2014/main" id="{432A1C18-0FD7-4B26-BE14-5B60B03E6422}"/>
+                <a16:creationId xmlns:a16="http://schemas.microsoft.com/office/drawing/2014/main" xmlns="" id="{432A1C18-0FD7-4B26-BE14-5B60B03E6422}"/>
               </a:ext>
             </a:extLst>
           </p:cNvPr>
@@ -2888,7 +2888,7 @@
           <p:cNvPr id="10" name="Picture Placeholder 9">
             <a:extLst>
               <a:ext uri="{FF2B5EF4-FFF2-40B4-BE49-F238E27FC236}">
-                <a16:creationId xmlns="" xmlns:a16="http://schemas.microsoft.com/office/drawing/2014/main" id="{2DADA13B-2ECC-46A5-A25E-FD320C56426E}"/>
+                <a16:creationId xmlns:a16="http://schemas.microsoft.com/office/drawing/2014/main" xmlns="" id="{2DADA13B-2ECC-46A5-A25E-FD320C56426E}"/>
               </a:ext>
             </a:extLst>
           </p:cNvPr>
@@ -2996,7 +2996,7 @@
           <p:cNvPr id="5" name="Picture Placeholder 4">
             <a:extLst>
               <a:ext uri="{FF2B5EF4-FFF2-40B4-BE49-F238E27FC236}">
-                <a16:creationId xmlns="" xmlns:a16="http://schemas.microsoft.com/office/drawing/2014/main" id="{EF4D32DD-C61A-484E-9207-DFB7DCC623CC}"/>
+                <a16:creationId xmlns:a16="http://schemas.microsoft.com/office/drawing/2014/main" xmlns="" id="{EF4D32DD-C61A-484E-9207-DFB7DCC623CC}"/>
               </a:ext>
             </a:extLst>
           </p:cNvPr>
@@ -3104,7 +3104,7 @@
           <p:cNvPr id="5" name="Picture Placeholder 4">
             <a:extLst>
               <a:ext uri="{FF2B5EF4-FFF2-40B4-BE49-F238E27FC236}">
-                <a16:creationId xmlns="" xmlns:a16="http://schemas.microsoft.com/office/drawing/2014/main" id="{23DB1127-3E1D-4E80-8B4F-A201ECC9F71A}"/>
+                <a16:creationId xmlns:a16="http://schemas.microsoft.com/office/drawing/2014/main" xmlns="" id="{23DB1127-3E1D-4E80-8B4F-A201ECC9F71A}"/>
               </a:ext>
             </a:extLst>
           </p:cNvPr>
@@ -3212,7 +3212,7 @@
           <p:cNvPr id="8" name="Picture Placeholder 7">
             <a:extLst>
               <a:ext uri="{FF2B5EF4-FFF2-40B4-BE49-F238E27FC236}">
-                <a16:creationId xmlns="" xmlns:a16="http://schemas.microsoft.com/office/drawing/2014/main" id="{AD160F8C-CA03-496C-82EB-5F365FC8A5F7}"/>
+                <a16:creationId xmlns:a16="http://schemas.microsoft.com/office/drawing/2014/main" xmlns="" id="{AD160F8C-CA03-496C-82EB-5F365FC8A5F7}"/>
               </a:ext>
             </a:extLst>
           </p:cNvPr>
@@ -3290,7 +3290,7 @@
           <p:cNvPr id="7" name="Picture Placeholder 6">
             <a:extLst>
               <a:ext uri="{FF2B5EF4-FFF2-40B4-BE49-F238E27FC236}">
-                <a16:creationId xmlns="" xmlns:a16="http://schemas.microsoft.com/office/drawing/2014/main" id="{B2151F10-F93E-4B3A-8C4B-4FE56AC1CA5A}"/>
+                <a16:creationId xmlns:a16="http://schemas.microsoft.com/office/drawing/2014/main" xmlns="" id="{B2151F10-F93E-4B3A-8C4B-4FE56AC1CA5A}"/>
               </a:ext>
             </a:extLst>
           </p:cNvPr>
@@ -3398,7 +3398,7 @@
           <p:cNvPr id="8" name="Picture Placeholder 7">
             <a:extLst>
               <a:ext uri="{FF2B5EF4-FFF2-40B4-BE49-F238E27FC236}">
-                <a16:creationId xmlns="" xmlns:a16="http://schemas.microsoft.com/office/drawing/2014/main" id="{F1A34304-A715-46B8-8F0B-352AD1883D01}"/>
+                <a16:creationId xmlns:a16="http://schemas.microsoft.com/office/drawing/2014/main" xmlns="" id="{F1A34304-A715-46B8-8F0B-352AD1883D01}"/>
               </a:ext>
             </a:extLst>
           </p:cNvPr>
@@ -3476,7 +3476,7 @@
           <p:cNvPr id="7" name="Picture Placeholder 6">
             <a:extLst>
               <a:ext uri="{FF2B5EF4-FFF2-40B4-BE49-F238E27FC236}">
-                <a16:creationId xmlns="" xmlns:a16="http://schemas.microsoft.com/office/drawing/2014/main" id="{8590D71F-D0FF-4DAF-9F3F-6BF8D7375961}"/>
+                <a16:creationId xmlns:a16="http://schemas.microsoft.com/office/drawing/2014/main" xmlns="" id="{8590D71F-D0FF-4DAF-9F3F-6BF8D7375961}"/>
               </a:ext>
             </a:extLst>
           </p:cNvPr>
@@ -3584,7 +3584,7 @@
           <p:cNvPr id="6" name="Picture Placeholder 5">
             <a:extLst>
               <a:ext uri="{FF2B5EF4-FFF2-40B4-BE49-F238E27FC236}">
-                <a16:creationId xmlns="" xmlns:a16="http://schemas.microsoft.com/office/drawing/2014/main" id="{D6E902D0-E2C7-4A60-A6B4-0644117BD7C4}"/>
+                <a16:creationId xmlns:a16="http://schemas.microsoft.com/office/drawing/2014/main" xmlns="" id="{D6E902D0-E2C7-4A60-A6B4-0644117BD7C4}"/>
               </a:ext>
             </a:extLst>
           </p:cNvPr>
@@ -3692,7 +3692,7 @@
           <p:cNvPr id="2" name="Picture Placeholder 4">
             <a:extLst>
               <a:ext uri="{FF2B5EF4-FFF2-40B4-BE49-F238E27FC236}">
-                <a16:creationId xmlns="" xmlns:a16="http://schemas.microsoft.com/office/drawing/2014/main" id="{3C1E0E71-5B85-406F-BE23-4D2270C4D18C}"/>
+                <a16:creationId xmlns:a16="http://schemas.microsoft.com/office/drawing/2014/main" xmlns="" id="{3C1E0E71-5B85-406F-BE23-4D2270C4D18C}"/>
               </a:ext>
             </a:extLst>
           </p:cNvPr>
@@ -3746,7 +3746,7 @@
               </a14:hiddenEffects>
             </a:ext>
             <a:ext uri="{FAA26D3D-D897-4be2-8F04-BA451C77F1D7}">
-              <ma14:placeholderFlag xmlns="" xmlns:ma14="http://schemas.microsoft.com/office/mac/drawingml/2011/main" val="1"/>
+              <ma14:placeholderFlag xmlns:ma14="http://schemas.microsoft.com/office/mac/drawingml/2011/main" xmlns="" val="1"/>
             </a:ext>
           </a:extLst>
         </p:spPr>
@@ -3795,7 +3795,7 @@
           <p:cNvPr id="5" name="Picture Placeholder 4">
             <a:extLst>
               <a:ext uri="{FF2B5EF4-FFF2-40B4-BE49-F238E27FC236}">
-                <a16:creationId xmlns="" xmlns:a16="http://schemas.microsoft.com/office/drawing/2014/main" id="{26964376-DCE5-4A85-9203-35AD18F44C97}"/>
+                <a16:creationId xmlns:a16="http://schemas.microsoft.com/office/drawing/2014/main" xmlns="" id="{26964376-DCE5-4A85-9203-35AD18F44C97}"/>
               </a:ext>
             </a:extLst>
           </p:cNvPr>
@@ -3919,7 +3919,7 @@
           <p:cNvPr id="3" name="Picture Placeholder 4">
             <a:extLst>
               <a:ext uri="{FF2B5EF4-FFF2-40B4-BE49-F238E27FC236}">
-                <a16:creationId xmlns="" xmlns:a16="http://schemas.microsoft.com/office/drawing/2014/main" id="{5D615512-87BF-4489-94E7-1D77F81AEB49}"/>
+                <a16:creationId xmlns:a16="http://schemas.microsoft.com/office/drawing/2014/main" xmlns="" id="{5D615512-87BF-4489-94E7-1D77F81AEB49}"/>
               </a:ext>
             </a:extLst>
           </p:cNvPr>
@@ -4016,7 +4016,7 @@
               </a14:hiddenEffects>
             </a:ext>
             <a:ext uri="{FAA26D3D-D897-4be2-8F04-BA451C77F1D7}">
-              <ma14:placeholderFlag xmlns="" xmlns:ma14="http://schemas.microsoft.com/office/mac/drawingml/2011/main" val="1"/>
+              <ma14:placeholderFlag xmlns:ma14="http://schemas.microsoft.com/office/mac/drawingml/2011/main" xmlns="" val="1"/>
             </a:ext>
           </a:extLst>
         </p:spPr>
@@ -4065,7 +4065,7 @@
           <p:cNvPr id="5" name="Picture Placeholder 4">
             <a:extLst>
               <a:ext uri="{FF2B5EF4-FFF2-40B4-BE49-F238E27FC236}">
-                <a16:creationId xmlns="" xmlns:a16="http://schemas.microsoft.com/office/drawing/2014/main" id="{C5E886AA-7533-444F-A04B-31EB6ECEE18A}"/>
+                <a16:creationId xmlns:a16="http://schemas.microsoft.com/office/drawing/2014/main" xmlns="" id="{C5E886AA-7533-444F-A04B-31EB6ECEE18A}"/>
               </a:ext>
             </a:extLst>
           </p:cNvPr>
@@ -4128,7 +4128,7 @@
           <p:cNvPr id="7" name="Picture Placeholder 6">
             <a:extLst>
               <a:ext uri="{FF2B5EF4-FFF2-40B4-BE49-F238E27FC236}">
-                <a16:creationId xmlns="" xmlns:a16="http://schemas.microsoft.com/office/drawing/2014/main" id="{C3F7581C-CEED-43B5-9291-751D78F5563F}"/>
+                <a16:creationId xmlns:a16="http://schemas.microsoft.com/office/drawing/2014/main" xmlns="" id="{C3F7581C-CEED-43B5-9291-751D78F5563F}"/>
               </a:ext>
             </a:extLst>
           </p:cNvPr>
@@ -4206,7 +4206,7 @@
           <p:cNvPr id="8" name="Picture Placeholder 7">
             <a:extLst>
               <a:ext uri="{FF2B5EF4-FFF2-40B4-BE49-F238E27FC236}">
-                <a16:creationId xmlns="" xmlns:a16="http://schemas.microsoft.com/office/drawing/2014/main" id="{335BEBF6-4FD6-4F6F-AD92-79A3C41CFA13}"/>
+                <a16:creationId xmlns:a16="http://schemas.microsoft.com/office/drawing/2014/main" xmlns="" id="{335BEBF6-4FD6-4F6F-AD92-79A3C41CFA13}"/>
               </a:ext>
             </a:extLst>
           </p:cNvPr>
@@ -4314,7 +4314,7 @@
           <p:cNvPr id="5" name="Picture Placeholder 4">
             <a:extLst>
               <a:ext uri="{FF2B5EF4-FFF2-40B4-BE49-F238E27FC236}">
-                <a16:creationId xmlns="" xmlns:a16="http://schemas.microsoft.com/office/drawing/2014/main" id="{63FFFDE0-9D05-4907-A7FB-6E433F8ED862}"/>
+                <a16:creationId xmlns:a16="http://schemas.microsoft.com/office/drawing/2014/main" xmlns="" id="{63FFFDE0-9D05-4907-A7FB-6E433F8ED862}"/>
               </a:ext>
             </a:extLst>
           </p:cNvPr>
@@ -4422,7 +4422,7 @@
           <p:cNvPr id="8" name="Picture Placeholder 7">
             <a:extLst>
               <a:ext uri="{FF2B5EF4-FFF2-40B4-BE49-F238E27FC236}">
-                <a16:creationId xmlns="" xmlns:a16="http://schemas.microsoft.com/office/drawing/2014/main" id="{1F29A6A4-29FA-4418-AE1E-D0194DB36698}"/>
+                <a16:creationId xmlns:a16="http://schemas.microsoft.com/office/drawing/2014/main" xmlns="" id="{1F29A6A4-29FA-4418-AE1E-D0194DB36698}"/>
               </a:ext>
             </a:extLst>
           </p:cNvPr>
@@ -4500,7 +4500,7 @@
           <p:cNvPr id="7" name="Picture Placeholder 6">
             <a:extLst>
               <a:ext uri="{FF2B5EF4-FFF2-40B4-BE49-F238E27FC236}">
-                <a16:creationId xmlns="" xmlns:a16="http://schemas.microsoft.com/office/drawing/2014/main" id="{8E850855-84DD-463A-BF35-5AED12651A0C}"/>
+                <a16:creationId xmlns:a16="http://schemas.microsoft.com/office/drawing/2014/main" xmlns="" id="{8E850855-84DD-463A-BF35-5AED12651A0C}"/>
               </a:ext>
             </a:extLst>
           </p:cNvPr>
@@ -4608,7 +4608,7 @@
           <p:cNvPr id="8" name="Picture Placeholder 7">
             <a:extLst>
               <a:ext uri="{FF2B5EF4-FFF2-40B4-BE49-F238E27FC236}">
-                <a16:creationId xmlns="" xmlns:a16="http://schemas.microsoft.com/office/drawing/2014/main" id="{A1068BE7-627C-415C-BE75-8EDC915F282D}"/>
+                <a16:creationId xmlns:a16="http://schemas.microsoft.com/office/drawing/2014/main" xmlns="" id="{A1068BE7-627C-415C-BE75-8EDC915F282D}"/>
               </a:ext>
             </a:extLst>
           </p:cNvPr>
@@ -4686,7 +4686,7 @@
           <p:cNvPr id="7" name="Picture Placeholder 6">
             <a:extLst>
               <a:ext uri="{FF2B5EF4-FFF2-40B4-BE49-F238E27FC236}">
-                <a16:creationId xmlns="" xmlns:a16="http://schemas.microsoft.com/office/drawing/2014/main" id="{DE6A9245-AE35-4F32-B650-3AFB4EF911DE}"/>
+                <a16:creationId xmlns:a16="http://schemas.microsoft.com/office/drawing/2014/main" xmlns="" id="{DE6A9245-AE35-4F32-B650-3AFB4EF911DE}"/>
               </a:ext>
             </a:extLst>
           </p:cNvPr>
@@ -5121,7 +5121,7 @@
   </p:txStyles>
   <p:extLst mod="1">
     <p:ext uri="{27BBF7A9-308A-43DC-89C8-2F10F3537804}">
-      <p15:sldGuideLst xmlns="" xmlns:p15="http://schemas.microsoft.com/office/powerpoint/2012/main">
+      <p15:sldGuideLst xmlns:p15="http://schemas.microsoft.com/office/powerpoint/2012/main" xmlns="">
         <p15:guide id="1" orient="horz" pos="3840">
           <p15:clr>
             <a:srgbClr val="F26B43"/>
@@ -5242,7 +5242,7 @@
           <p:cNvPr id="5" name="TextBox 4">
             <a:extLst>
               <a:ext uri="{FF2B5EF4-FFF2-40B4-BE49-F238E27FC236}">
-                <a16:creationId xmlns="" xmlns:a16="http://schemas.microsoft.com/office/drawing/2014/main" id="{4AAAAF73-B5C9-417E-8F91-E70BD6CCCC7B}"/>
+                <a16:creationId xmlns:a16="http://schemas.microsoft.com/office/drawing/2014/main" xmlns="" id="{4AAAAF73-B5C9-417E-8F91-E70BD6CCCC7B}"/>
               </a:ext>
             </a:extLst>
           </p:cNvPr>
@@ -5293,7 +5293,7 @@
           <p:cNvPr id="6" name="TextBox 5">
             <a:extLst>
               <a:ext uri="{FF2B5EF4-FFF2-40B4-BE49-F238E27FC236}">
-                <a16:creationId xmlns="" xmlns:a16="http://schemas.microsoft.com/office/drawing/2014/main" id="{FA49EA13-2E6A-46A0-A6B6-4EC50EE8D481}"/>
+                <a16:creationId xmlns:a16="http://schemas.microsoft.com/office/drawing/2014/main" xmlns="" id="{FA49EA13-2E6A-46A0-A6B6-4EC50EE8D481}"/>
               </a:ext>
             </a:extLst>
           </p:cNvPr>
@@ -5425,7 +5425,7 @@
           <p:cNvPr id="29" name="TextBox 28">
             <a:extLst>
               <a:ext uri="{FF2B5EF4-FFF2-40B4-BE49-F238E27FC236}">
-                <a16:creationId xmlns="" xmlns:a16="http://schemas.microsoft.com/office/drawing/2014/main" id="{9614727F-E6ED-474F-80C1-1AA9A1F473B9}"/>
+                <a16:creationId xmlns:a16="http://schemas.microsoft.com/office/drawing/2014/main" xmlns="" id="{9614727F-E6ED-474F-80C1-1AA9A1F473B9}"/>
               </a:ext>
             </a:extLst>
           </p:cNvPr>
@@ -5509,7 +5509,7 @@
           <p:cNvPr id="38" name="Rectangle 37">
             <a:extLst>
               <a:ext uri="{FF2B5EF4-FFF2-40B4-BE49-F238E27FC236}">
-                <a16:creationId xmlns="" xmlns:a16="http://schemas.microsoft.com/office/drawing/2014/main" id="{DECD64ED-2EB5-4FAE-A047-C55E50A44E94}"/>
+                <a16:creationId xmlns:a16="http://schemas.microsoft.com/office/drawing/2014/main" xmlns="" id="{DECD64ED-2EB5-4FAE-A047-C55E50A44E94}"/>
               </a:ext>
             </a:extLst>
           </p:cNvPr>
@@ -5567,7 +5567,7 @@
           <p:cNvPr id="12" name="7 CuadroTexto">
             <a:extLst>
               <a:ext uri="{FF2B5EF4-FFF2-40B4-BE49-F238E27FC236}">
-                <a16:creationId xmlns="" xmlns:a16="http://schemas.microsoft.com/office/drawing/2014/main" id="{2A3771CF-C9F1-4B5C-8B5E-DDFAE8235054}"/>
+                <a16:creationId xmlns:a16="http://schemas.microsoft.com/office/drawing/2014/main" xmlns="" id="{2A3771CF-C9F1-4B5C-8B5E-DDFAE8235054}"/>
               </a:ext>
             </a:extLst>
           </p:cNvPr>
@@ -6121,7 +6121,7 @@
           <p:cNvPr id="14" name="7 CuadroTexto">
             <a:extLst>
               <a:ext uri="{FF2B5EF4-FFF2-40B4-BE49-F238E27FC236}">
-                <a16:creationId xmlns="" xmlns:a16="http://schemas.microsoft.com/office/drawing/2014/main" id="{2A3771CF-C9F1-4B5C-8B5E-DDFAE8235054}"/>
+                <a16:creationId xmlns:a16="http://schemas.microsoft.com/office/drawing/2014/main" xmlns="" id="{2A3771CF-C9F1-4B5C-8B5E-DDFAE8235054}"/>
               </a:ext>
             </a:extLst>
           </p:cNvPr>
@@ -6613,7 +6613,7 @@
           <p:cNvPr id="3" name="TextBox 2">
             <a:extLst>
               <a:ext uri="{FF2B5EF4-FFF2-40B4-BE49-F238E27FC236}">
-                <a16:creationId xmlns="" xmlns:a16="http://schemas.microsoft.com/office/drawing/2014/main" id="{7C77C6A0-4662-4449-A4DE-4937FBF3C1FB}"/>
+                <a16:creationId xmlns:a16="http://schemas.microsoft.com/office/drawing/2014/main" xmlns="" id="{7C77C6A0-4662-4449-A4DE-4937FBF3C1FB}"/>
               </a:ext>
             </a:extLst>
           </p:cNvPr>
@@ -6663,7 +6663,7 @@
           <p:cNvPr id="6" name="TextBox 5">
             <a:extLst>
               <a:ext uri="{FF2B5EF4-FFF2-40B4-BE49-F238E27FC236}">
-                <a16:creationId xmlns="" xmlns:a16="http://schemas.microsoft.com/office/drawing/2014/main" id="{A4D7B5DD-B7F7-4D1D-A763-25216AB29950}"/>
+                <a16:creationId xmlns:a16="http://schemas.microsoft.com/office/drawing/2014/main" xmlns="" id="{A4D7B5DD-B7F7-4D1D-A763-25216AB29950}"/>
               </a:ext>
             </a:extLst>
           </p:cNvPr>
@@ -6798,7 +6798,7 @@
           <p:cNvPr id="15" name="TextBox 14">
             <a:extLst>
               <a:ext uri="{FF2B5EF4-FFF2-40B4-BE49-F238E27FC236}">
-                <a16:creationId xmlns="" xmlns:a16="http://schemas.microsoft.com/office/drawing/2014/main" id="{DFE2598A-A944-4222-85C2-F57D0AB6CBE7}"/>
+                <a16:creationId xmlns:a16="http://schemas.microsoft.com/office/drawing/2014/main" xmlns="" id="{DFE2598A-A944-4222-85C2-F57D0AB6CBE7}"/>
               </a:ext>
             </a:extLst>
           </p:cNvPr>
@@ -6918,7 +6918,7 @@
           <p:cNvPr id="19" name="TextBox 18">
             <a:extLst>
               <a:ext uri="{FF2B5EF4-FFF2-40B4-BE49-F238E27FC236}">
-                <a16:creationId xmlns="" xmlns:a16="http://schemas.microsoft.com/office/drawing/2014/main" id="{7C77C6A0-4662-4449-A4DE-4937FBF3C1FB}"/>
+                <a16:creationId xmlns:a16="http://schemas.microsoft.com/office/drawing/2014/main" xmlns="" id="{7C77C6A0-4662-4449-A4DE-4937FBF3C1FB}"/>
               </a:ext>
             </a:extLst>
           </p:cNvPr>
@@ -7015,7 +7015,7 @@
             <p:cNvPr id="35" name="Freeform 3">
               <a:extLst>
                 <a:ext uri="{FF2B5EF4-FFF2-40B4-BE49-F238E27FC236}">
-                  <a16:creationId xmlns="" xmlns:a16="http://schemas.microsoft.com/office/drawing/2014/main" id="{07AE0879-2CEE-40F7-A338-927517229AD5}"/>
+                  <a16:creationId xmlns:a16="http://schemas.microsoft.com/office/drawing/2014/main" xmlns="" id="{07AE0879-2CEE-40F7-A338-927517229AD5}"/>
                 </a:ext>
               </a:extLst>
             </p:cNvPr>
@@ -7117,7 +7117,7 @@
             <p:cNvPr id="37" name="Freeform 16">
               <a:extLst>
                 <a:ext uri="{FF2B5EF4-FFF2-40B4-BE49-F238E27FC236}">
-                  <a16:creationId xmlns="" xmlns:a16="http://schemas.microsoft.com/office/drawing/2014/main" id="{6D82F557-8FF6-4D4F-9761-165C98ECA845}"/>
+                  <a16:creationId xmlns:a16="http://schemas.microsoft.com/office/drawing/2014/main" xmlns="" id="{6D82F557-8FF6-4D4F-9761-165C98ECA845}"/>
                 </a:ext>
               </a:extLst>
             </p:cNvPr>
@@ -7219,7 +7219,7 @@
             <p:cNvPr id="38" name="Freeform 7">
               <a:extLst>
                 <a:ext uri="{FF2B5EF4-FFF2-40B4-BE49-F238E27FC236}">
-                  <a16:creationId xmlns="" xmlns:a16="http://schemas.microsoft.com/office/drawing/2014/main" id="{B11DDA62-F1B4-40EC-AB53-B4639509FC9C}"/>
+                  <a16:creationId xmlns:a16="http://schemas.microsoft.com/office/drawing/2014/main" xmlns="" id="{B11DDA62-F1B4-40EC-AB53-B4639509FC9C}"/>
                 </a:ext>
               </a:extLst>
             </p:cNvPr>
@@ -7321,7 +7321,7 @@
             <p:cNvPr id="43" name="Freeform 15">
               <a:extLst>
                 <a:ext uri="{FF2B5EF4-FFF2-40B4-BE49-F238E27FC236}">
-                  <a16:creationId xmlns="" xmlns:a16="http://schemas.microsoft.com/office/drawing/2014/main" id="{89DB968B-0B9E-48FF-A2A6-AECDDBDC097A}"/>
+                  <a16:creationId xmlns:a16="http://schemas.microsoft.com/office/drawing/2014/main" xmlns="" id="{89DB968B-0B9E-48FF-A2A6-AECDDBDC097A}"/>
                 </a:ext>
               </a:extLst>
             </p:cNvPr>
@@ -7454,7 +7454,7 @@
             <p:cNvPr id="47" name="Freeform 3">
               <a:extLst>
                 <a:ext uri="{FF2B5EF4-FFF2-40B4-BE49-F238E27FC236}">
-                  <a16:creationId xmlns="" xmlns:a16="http://schemas.microsoft.com/office/drawing/2014/main" id="{07AE0879-2CEE-40F7-A338-927517229AD5}"/>
+                  <a16:creationId xmlns:a16="http://schemas.microsoft.com/office/drawing/2014/main" xmlns="" id="{07AE0879-2CEE-40F7-A338-927517229AD5}"/>
                 </a:ext>
               </a:extLst>
             </p:cNvPr>
@@ -7556,7 +7556,7 @@
             <p:cNvPr id="48" name="Freeform 16">
               <a:extLst>
                 <a:ext uri="{FF2B5EF4-FFF2-40B4-BE49-F238E27FC236}">
-                  <a16:creationId xmlns="" xmlns:a16="http://schemas.microsoft.com/office/drawing/2014/main" id="{6D82F557-8FF6-4D4F-9761-165C98ECA845}"/>
+                  <a16:creationId xmlns:a16="http://schemas.microsoft.com/office/drawing/2014/main" xmlns="" id="{6D82F557-8FF6-4D4F-9761-165C98ECA845}"/>
                 </a:ext>
               </a:extLst>
             </p:cNvPr>
@@ -7658,7 +7658,7 @@
             <p:cNvPr id="49" name="Freeform 7">
               <a:extLst>
                 <a:ext uri="{FF2B5EF4-FFF2-40B4-BE49-F238E27FC236}">
-                  <a16:creationId xmlns="" xmlns:a16="http://schemas.microsoft.com/office/drawing/2014/main" id="{B11DDA62-F1B4-40EC-AB53-B4639509FC9C}"/>
+                  <a16:creationId xmlns:a16="http://schemas.microsoft.com/office/drawing/2014/main" xmlns="" id="{B11DDA62-F1B4-40EC-AB53-B4639509FC9C}"/>
                 </a:ext>
               </a:extLst>
             </p:cNvPr>
@@ -7760,7 +7760,7 @@
             <p:cNvPr id="50" name="Freeform 15">
               <a:extLst>
                 <a:ext uri="{FF2B5EF4-FFF2-40B4-BE49-F238E27FC236}">
-                  <a16:creationId xmlns="" xmlns:a16="http://schemas.microsoft.com/office/drawing/2014/main" id="{89DB968B-0B9E-48FF-A2A6-AECDDBDC097A}"/>
+                  <a16:creationId xmlns:a16="http://schemas.microsoft.com/office/drawing/2014/main" xmlns="" id="{89DB968B-0B9E-48FF-A2A6-AECDDBDC097A}"/>
                 </a:ext>
               </a:extLst>
             </p:cNvPr>
@@ -8590,7 +8590,7 @@
             <p:cNvPr id="52" name="Freeform 3">
               <a:extLst>
                 <a:ext uri="{FF2B5EF4-FFF2-40B4-BE49-F238E27FC236}">
-                  <a16:creationId xmlns="" xmlns:a16="http://schemas.microsoft.com/office/drawing/2014/main" id="{07AE0879-2CEE-40F7-A338-927517229AD5}"/>
+                  <a16:creationId xmlns:a16="http://schemas.microsoft.com/office/drawing/2014/main" xmlns="" id="{07AE0879-2CEE-40F7-A338-927517229AD5}"/>
                 </a:ext>
               </a:extLst>
             </p:cNvPr>
@@ -8692,7 +8692,7 @@
             <p:cNvPr id="53" name="Freeform 16">
               <a:extLst>
                 <a:ext uri="{FF2B5EF4-FFF2-40B4-BE49-F238E27FC236}">
-                  <a16:creationId xmlns="" xmlns:a16="http://schemas.microsoft.com/office/drawing/2014/main" id="{6D82F557-8FF6-4D4F-9761-165C98ECA845}"/>
+                  <a16:creationId xmlns:a16="http://schemas.microsoft.com/office/drawing/2014/main" xmlns="" id="{6D82F557-8FF6-4D4F-9761-165C98ECA845}"/>
                 </a:ext>
               </a:extLst>
             </p:cNvPr>
@@ -8794,7 +8794,7 @@
             <p:cNvPr id="54" name="Freeform 7">
               <a:extLst>
                 <a:ext uri="{FF2B5EF4-FFF2-40B4-BE49-F238E27FC236}">
-                  <a16:creationId xmlns="" xmlns:a16="http://schemas.microsoft.com/office/drawing/2014/main" id="{B11DDA62-F1B4-40EC-AB53-B4639509FC9C}"/>
+                  <a16:creationId xmlns:a16="http://schemas.microsoft.com/office/drawing/2014/main" xmlns="" id="{B11DDA62-F1B4-40EC-AB53-B4639509FC9C}"/>
                 </a:ext>
               </a:extLst>
             </p:cNvPr>
@@ -8896,7 +8896,7 @@
             <p:cNvPr id="55" name="Freeform 15">
               <a:extLst>
                 <a:ext uri="{FF2B5EF4-FFF2-40B4-BE49-F238E27FC236}">
-                  <a16:creationId xmlns="" xmlns:a16="http://schemas.microsoft.com/office/drawing/2014/main" id="{89DB968B-0B9E-48FF-A2A6-AECDDBDC097A}"/>
+                  <a16:creationId xmlns:a16="http://schemas.microsoft.com/office/drawing/2014/main" xmlns="" id="{89DB968B-0B9E-48FF-A2A6-AECDDBDC097A}"/>
                 </a:ext>
               </a:extLst>
             </p:cNvPr>
@@ -9029,7 +9029,7 @@
             <p:cNvPr id="57" name="Freeform 3">
               <a:extLst>
                 <a:ext uri="{FF2B5EF4-FFF2-40B4-BE49-F238E27FC236}">
-                  <a16:creationId xmlns="" xmlns:a16="http://schemas.microsoft.com/office/drawing/2014/main" id="{07AE0879-2CEE-40F7-A338-927517229AD5}"/>
+                  <a16:creationId xmlns:a16="http://schemas.microsoft.com/office/drawing/2014/main" xmlns="" id="{07AE0879-2CEE-40F7-A338-927517229AD5}"/>
                 </a:ext>
               </a:extLst>
             </p:cNvPr>
@@ -9131,7 +9131,7 @@
             <p:cNvPr id="58" name="Freeform 16">
               <a:extLst>
                 <a:ext uri="{FF2B5EF4-FFF2-40B4-BE49-F238E27FC236}">
-                  <a16:creationId xmlns="" xmlns:a16="http://schemas.microsoft.com/office/drawing/2014/main" id="{6D82F557-8FF6-4D4F-9761-165C98ECA845}"/>
+                  <a16:creationId xmlns:a16="http://schemas.microsoft.com/office/drawing/2014/main" xmlns="" id="{6D82F557-8FF6-4D4F-9761-165C98ECA845}"/>
                 </a:ext>
               </a:extLst>
             </p:cNvPr>
@@ -9233,7 +9233,7 @@
             <p:cNvPr id="59" name="Freeform 7">
               <a:extLst>
                 <a:ext uri="{FF2B5EF4-FFF2-40B4-BE49-F238E27FC236}">
-                  <a16:creationId xmlns="" xmlns:a16="http://schemas.microsoft.com/office/drawing/2014/main" id="{B11DDA62-F1B4-40EC-AB53-B4639509FC9C}"/>
+                  <a16:creationId xmlns:a16="http://schemas.microsoft.com/office/drawing/2014/main" xmlns="" id="{B11DDA62-F1B4-40EC-AB53-B4639509FC9C}"/>
                 </a:ext>
               </a:extLst>
             </p:cNvPr>
@@ -9335,7 +9335,7 @@
             <p:cNvPr id="60" name="Freeform 15">
               <a:extLst>
                 <a:ext uri="{FF2B5EF4-FFF2-40B4-BE49-F238E27FC236}">
-                  <a16:creationId xmlns="" xmlns:a16="http://schemas.microsoft.com/office/drawing/2014/main" id="{89DB968B-0B9E-48FF-A2A6-AECDDBDC097A}"/>
+                  <a16:creationId xmlns:a16="http://schemas.microsoft.com/office/drawing/2014/main" xmlns="" id="{89DB968B-0B9E-48FF-A2A6-AECDDBDC097A}"/>
                 </a:ext>
               </a:extLst>
             </p:cNvPr>
@@ -9454,7 +9454,7 @@
           <p:cNvPr id="61" name="TextBox 60">
             <a:extLst>
               <a:ext uri="{FF2B5EF4-FFF2-40B4-BE49-F238E27FC236}">
-                <a16:creationId xmlns="" xmlns:a16="http://schemas.microsoft.com/office/drawing/2014/main" id="{7C77C6A0-4662-4449-A4DE-4937FBF3C1FB}"/>
+                <a16:creationId xmlns:a16="http://schemas.microsoft.com/office/drawing/2014/main" xmlns="" id="{7C77C6A0-4662-4449-A4DE-4937FBF3C1FB}"/>
               </a:ext>
             </a:extLst>
           </p:cNvPr>
@@ -12307,7 +12307,7 @@
           <p:cNvPr id="69" name="TextBox 68">
             <a:extLst>
               <a:ext uri="{FF2B5EF4-FFF2-40B4-BE49-F238E27FC236}">
-                <a16:creationId xmlns="" xmlns:a16="http://schemas.microsoft.com/office/drawing/2014/main" id="{7C77C6A0-4662-4449-A4DE-4937FBF3C1FB}"/>
+                <a16:creationId xmlns:a16="http://schemas.microsoft.com/office/drawing/2014/main" xmlns="" id="{7C77C6A0-4662-4449-A4DE-4937FBF3C1FB}"/>
               </a:ext>
             </a:extLst>
           </p:cNvPr>
@@ -12357,7 +12357,7 @@
           <p:cNvPr id="70" name="Rectangle 69">
             <a:extLst>
               <a:ext uri="{FF2B5EF4-FFF2-40B4-BE49-F238E27FC236}">
-                <a16:creationId xmlns="" xmlns:a16="http://schemas.microsoft.com/office/drawing/2014/main" id="{DECD64ED-2EB5-4FAE-A047-C55E50A44E94}"/>
+                <a16:creationId xmlns:a16="http://schemas.microsoft.com/office/drawing/2014/main" xmlns="" id="{DECD64ED-2EB5-4FAE-A047-C55E50A44E94}"/>
               </a:ext>
             </a:extLst>
           </p:cNvPr>
@@ -12760,7 +12760,7 @@
           <p:cNvPr id="72" name="TextBox 71">
             <a:extLst>
               <a:ext uri="{FF2B5EF4-FFF2-40B4-BE49-F238E27FC236}">
-                <a16:creationId xmlns="" xmlns:a16="http://schemas.microsoft.com/office/drawing/2014/main" id="{A4D7B5DD-B7F7-4D1D-A763-25216AB29950}"/>
+                <a16:creationId xmlns:a16="http://schemas.microsoft.com/office/drawing/2014/main" xmlns="" id="{A4D7B5DD-B7F7-4D1D-A763-25216AB29950}"/>
               </a:ext>
             </a:extLst>
           </p:cNvPr>
@@ -12816,7 +12816,7 @@
           <p:cNvPr id="73" name="TextBox 72">
             <a:extLst>
               <a:ext uri="{FF2B5EF4-FFF2-40B4-BE49-F238E27FC236}">
-                <a16:creationId xmlns="" xmlns:a16="http://schemas.microsoft.com/office/drawing/2014/main" id="{A4D7B5DD-B7F7-4D1D-A763-25216AB29950}"/>
+                <a16:creationId xmlns:a16="http://schemas.microsoft.com/office/drawing/2014/main" xmlns="" id="{A4D7B5DD-B7F7-4D1D-A763-25216AB29950}"/>
               </a:ext>
             </a:extLst>
           </p:cNvPr>
@@ -13907,7 +13907,7 @@
           <p:cNvPr id="77" name="TextBox 76">
             <a:extLst>
               <a:ext uri="{FF2B5EF4-FFF2-40B4-BE49-F238E27FC236}">
-                <a16:creationId xmlns="" xmlns:a16="http://schemas.microsoft.com/office/drawing/2014/main" id="{A4D7B5DD-B7F7-4D1D-A763-25216AB29950}"/>
+                <a16:creationId xmlns:a16="http://schemas.microsoft.com/office/drawing/2014/main" xmlns="" id="{A4D7B5DD-B7F7-4D1D-A763-25216AB29950}"/>
               </a:ext>
             </a:extLst>
           </p:cNvPr>
@@ -17163,7 +17163,7 @@
           <p:cNvPr id="21" name="Rectangle 20">
             <a:extLst>
               <a:ext uri="{FF2B5EF4-FFF2-40B4-BE49-F238E27FC236}">
-                <a16:creationId xmlns="" xmlns:a16="http://schemas.microsoft.com/office/drawing/2014/main" id="{4C6642F4-37D5-4EE8-9964-E4E5E4B40520}"/>
+                <a16:creationId xmlns:a16="http://schemas.microsoft.com/office/drawing/2014/main" xmlns="" id="{4C6642F4-37D5-4EE8-9964-E4E5E4B40520}"/>
               </a:ext>
             </a:extLst>
           </p:cNvPr>
@@ -17223,7 +17223,7 @@
           <p:cNvPr id="20" name="Rectangle 19">
             <a:extLst>
               <a:ext uri="{FF2B5EF4-FFF2-40B4-BE49-F238E27FC236}">
-                <a16:creationId xmlns="" xmlns:a16="http://schemas.microsoft.com/office/drawing/2014/main" id="{4C6642F4-37D5-4EE8-9964-E4E5E4B40520}"/>
+                <a16:creationId xmlns:a16="http://schemas.microsoft.com/office/drawing/2014/main" xmlns="" id="{4C6642F4-37D5-4EE8-9964-E4E5E4B40520}"/>
               </a:ext>
             </a:extLst>
           </p:cNvPr>
@@ -17283,7 +17283,7 @@
           <p:cNvPr id="22" name="Rectangle 21">
             <a:extLst>
               <a:ext uri="{FF2B5EF4-FFF2-40B4-BE49-F238E27FC236}">
-                <a16:creationId xmlns="" xmlns:a16="http://schemas.microsoft.com/office/drawing/2014/main" id="{4C6642F4-37D5-4EE8-9964-E4E5E4B40520}"/>
+                <a16:creationId xmlns:a16="http://schemas.microsoft.com/office/drawing/2014/main" xmlns="" id="{4C6642F4-37D5-4EE8-9964-E4E5E4B40520}"/>
               </a:ext>
             </a:extLst>
           </p:cNvPr>
@@ -17343,7 +17343,7 @@
           <p:cNvPr id="2" name="Rectangle 1">
             <a:extLst>
               <a:ext uri="{FF2B5EF4-FFF2-40B4-BE49-F238E27FC236}">
-                <a16:creationId xmlns="" xmlns:a16="http://schemas.microsoft.com/office/drawing/2014/main" id="{4C6642F4-37D5-4EE8-9964-E4E5E4B40520}"/>
+                <a16:creationId xmlns:a16="http://schemas.microsoft.com/office/drawing/2014/main" xmlns="" id="{4C6642F4-37D5-4EE8-9964-E4E5E4B40520}"/>
               </a:ext>
             </a:extLst>
           </p:cNvPr>
@@ -17403,7 +17403,7 @@
           <p:cNvPr id="3" name="Rectangle 2">
             <a:extLst>
               <a:ext uri="{FF2B5EF4-FFF2-40B4-BE49-F238E27FC236}">
-                <a16:creationId xmlns="" xmlns:a16="http://schemas.microsoft.com/office/drawing/2014/main" id="{DECD64ED-2EB5-4FAE-A047-C55E50A44E94}"/>
+                <a16:creationId xmlns:a16="http://schemas.microsoft.com/office/drawing/2014/main" xmlns="" id="{DECD64ED-2EB5-4FAE-A047-C55E50A44E94}"/>
               </a:ext>
             </a:extLst>
           </p:cNvPr>
@@ -17461,7 +17461,7 @@
           <p:cNvPr id="10" name="Rectangle 9">
             <a:extLst>
               <a:ext uri="{FF2B5EF4-FFF2-40B4-BE49-F238E27FC236}">
-                <a16:creationId xmlns="" xmlns:a16="http://schemas.microsoft.com/office/drawing/2014/main" id="{37B58E2F-A32A-4129-A3C4-9D50402469D7}"/>
+                <a16:creationId xmlns:a16="http://schemas.microsoft.com/office/drawing/2014/main" xmlns="" id="{37B58E2F-A32A-4129-A3C4-9D50402469D7}"/>
               </a:ext>
             </a:extLst>
           </p:cNvPr>
@@ -17617,7 +17617,7 @@
           <p:cNvPr id="13" name="TextBox 12">
             <a:extLst>
               <a:ext uri="{FF2B5EF4-FFF2-40B4-BE49-F238E27FC236}">
-                <a16:creationId xmlns="" xmlns:a16="http://schemas.microsoft.com/office/drawing/2014/main" id="{A4F26F6B-3207-42F8-BD09-3C0C35B2B02C}"/>
+                <a16:creationId xmlns:a16="http://schemas.microsoft.com/office/drawing/2014/main" xmlns="" id="{A4F26F6B-3207-42F8-BD09-3C0C35B2B02C}"/>
               </a:ext>
             </a:extLst>
           </p:cNvPr>
@@ -21256,7 +21256,7 @@
           <p:cNvPr id="14" name="7 CuadroTexto">
             <a:extLst>
               <a:ext uri="{FF2B5EF4-FFF2-40B4-BE49-F238E27FC236}">
-                <a16:creationId xmlns="" xmlns:a16="http://schemas.microsoft.com/office/drawing/2014/main" id="{2A3771CF-C9F1-4B5C-8B5E-DDFAE8235054}"/>
+                <a16:creationId xmlns:a16="http://schemas.microsoft.com/office/drawing/2014/main" xmlns="" id="{2A3771CF-C9F1-4B5C-8B5E-DDFAE8235054}"/>
               </a:ext>
             </a:extLst>
           </p:cNvPr>
@@ -21312,7 +21312,7 @@
           <p:cNvPr id="9" name="Freeform 93">
             <a:extLst>
               <a:ext uri="{FF2B5EF4-FFF2-40B4-BE49-F238E27FC236}">
-                <a16:creationId xmlns="" xmlns:a16="http://schemas.microsoft.com/office/drawing/2014/main" id="{143BE668-13BB-4A16-9843-2910254F24FB}"/>
+                <a16:creationId xmlns:a16="http://schemas.microsoft.com/office/drawing/2014/main" xmlns="" id="{143BE668-13BB-4A16-9843-2910254F24FB}"/>
               </a:ext>
             </a:extLst>
           </p:cNvPr>
@@ -21685,7 +21685,7 @@
           <p:cNvPr id="30" name="Group 29">
             <a:extLst>
               <a:ext uri="{FF2B5EF4-FFF2-40B4-BE49-F238E27FC236}">
-                <a16:creationId xmlns="" xmlns:a16="http://schemas.microsoft.com/office/drawing/2014/main" id="{7A8F4BDD-B7C0-443C-B390-63AF1743B652}"/>
+                <a16:creationId xmlns:a16="http://schemas.microsoft.com/office/drawing/2014/main" xmlns="" id="{7A8F4BDD-B7C0-443C-B390-63AF1743B652}"/>
               </a:ext>
             </a:extLst>
           </p:cNvPr>
@@ -21705,7 +21705,7 @@
             <p:cNvPr id="19" name="Freeform 249">
               <a:extLst>
                 <a:ext uri="{FF2B5EF4-FFF2-40B4-BE49-F238E27FC236}">
-                  <a16:creationId xmlns="" xmlns:a16="http://schemas.microsoft.com/office/drawing/2014/main" id="{805385AF-8CEA-4DF1-979E-045092700520}"/>
+                  <a16:creationId xmlns:a16="http://schemas.microsoft.com/office/drawing/2014/main" xmlns="" id="{805385AF-8CEA-4DF1-979E-045092700520}"/>
                 </a:ext>
               </a:extLst>
             </p:cNvPr>
@@ -21810,7 +21810,7 @@
             <p:cNvPr id="20" name="Freeform 250">
               <a:extLst>
                 <a:ext uri="{FF2B5EF4-FFF2-40B4-BE49-F238E27FC236}">
-                  <a16:creationId xmlns="" xmlns:a16="http://schemas.microsoft.com/office/drawing/2014/main" id="{C6A5612F-966C-424E-B396-62E51ED5CBFC}"/>
+                  <a16:creationId xmlns:a16="http://schemas.microsoft.com/office/drawing/2014/main" xmlns="" id="{C6A5612F-966C-424E-B396-62E51ED5CBFC}"/>
                 </a:ext>
               </a:extLst>
             </p:cNvPr>
@@ -21927,7 +21927,7 @@
             <p:cNvPr id="21" name="Freeform 251">
               <a:extLst>
                 <a:ext uri="{FF2B5EF4-FFF2-40B4-BE49-F238E27FC236}">
-                  <a16:creationId xmlns="" xmlns:a16="http://schemas.microsoft.com/office/drawing/2014/main" id="{39946277-7C9B-4C68-871A-F87500C2BD65}"/>
+                  <a16:creationId xmlns:a16="http://schemas.microsoft.com/office/drawing/2014/main" xmlns="" id="{39946277-7C9B-4C68-871A-F87500C2BD65}"/>
                 </a:ext>
               </a:extLst>
             </p:cNvPr>
@@ -22044,7 +22044,7 @@
             <p:cNvPr id="22" name="Freeform 252">
               <a:extLst>
                 <a:ext uri="{FF2B5EF4-FFF2-40B4-BE49-F238E27FC236}">
-                  <a16:creationId xmlns="" xmlns:a16="http://schemas.microsoft.com/office/drawing/2014/main" id="{7EFF48C0-9550-4DC9-A301-B4C66D17417F}"/>
+                  <a16:creationId xmlns:a16="http://schemas.microsoft.com/office/drawing/2014/main" xmlns="" id="{7EFF48C0-9550-4DC9-A301-B4C66D17417F}"/>
                 </a:ext>
               </a:extLst>
             </p:cNvPr>
@@ -22177,7 +22177,7 @@
             <p:cNvPr id="23" name="Freeform 253">
               <a:extLst>
                 <a:ext uri="{FF2B5EF4-FFF2-40B4-BE49-F238E27FC236}">
-                  <a16:creationId xmlns="" xmlns:a16="http://schemas.microsoft.com/office/drawing/2014/main" id="{58C1A0CE-67B3-4A05-B90E-21DE9E583627}"/>
+                  <a16:creationId xmlns:a16="http://schemas.microsoft.com/office/drawing/2014/main" xmlns="" id="{58C1A0CE-67B3-4A05-B90E-21DE9E583627}"/>
                 </a:ext>
               </a:extLst>
             </p:cNvPr>
@@ -22558,7 +22558,7 @@
             <p:cNvPr id="24" name="Freeform 254">
               <a:extLst>
                 <a:ext uri="{FF2B5EF4-FFF2-40B4-BE49-F238E27FC236}">
-                  <a16:creationId xmlns="" xmlns:a16="http://schemas.microsoft.com/office/drawing/2014/main" id="{A113A14A-6D08-4DCF-BD3F-24E76647F04C}"/>
+                  <a16:creationId xmlns:a16="http://schemas.microsoft.com/office/drawing/2014/main" xmlns="" id="{A113A14A-6D08-4DCF-BD3F-24E76647F04C}"/>
                 </a:ext>
               </a:extLst>
             </p:cNvPr>
@@ -22969,7 +22969,7 @@
             <p:cNvPr id="25" name="Freeform 255">
               <a:extLst>
                 <a:ext uri="{FF2B5EF4-FFF2-40B4-BE49-F238E27FC236}">
-                  <a16:creationId xmlns="" xmlns:a16="http://schemas.microsoft.com/office/drawing/2014/main" id="{9EFFD3AD-48AA-4437-9052-1F27EA51EE1B}"/>
+                  <a16:creationId xmlns:a16="http://schemas.microsoft.com/office/drawing/2014/main" xmlns="" id="{9EFFD3AD-48AA-4437-9052-1F27EA51EE1B}"/>
                 </a:ext>
               </a:extLst>
             </p:cNvPr>
@@ -23071,7 +23071,7 @@
           <p:cNvPr id="29" name="TextBox 28">
             <a:extLst>
               <a:ext uri="{FF2B5EF4-FFF2-40B4-BE49-F238E27FC236}">
-                <a16:creationId xmlns="" xmlns:a16="http://schemas.microsoft.com/office/drawing/2014/main" id="{9614727F-E6ED-474F-80C1-1AA9A1F473B9}"/>
+                <a16:creationId xmlns:a16="http://schemas.microsoft.com/office/drawing/2014/main" xmlns="" id="{9614727F-E6ED-474F-80C1-1AA9A1F473B9}"/>
               </a:ext>
             </a:extLst>
           </p:cNvPr>
@@ -23132,7 +23132,7 @@
           <p:cNvPr id="33" name="7 CuadroTexto">
             <a:extLst>
               <a:ext uri="{FF2B5EF4-FFF2-40B4-BE49-F238E27FC236}">
-                <a16:creationId xmlns="" xmlns:a16="http://schemas.microsoft.com/office/drawing/2014/main" id="{2A3771CF-C9F1-4B5C-8B5E-DDFAE8235054}"/>
+                <a16:creationId xmlns:a16="http://schemas.microsoft.com/office/drawing/2014/main" xmlns="" id="{2A3771CF-C9F1-4B5C-8B5E-DDFAE8235054}"/>
               </a:ext>
             </a:extLst>
           </p:cNvPr>
@@ -23232,7 +23232,7 @@
           <p:cNvPr id="34" name="TextBox 33">
             <a:extLst>
               <a:ext uri="{FF2B5EF4-FFF2-40B4-BE49-F238E27FC236}">
-                <a16:creationId xmlns="" xmlns:a16="http://schemas.microsoft.com/office/drawing/2014/main" id="{9614727F-E6ED-474F-80C1-1AA9A1F473B9}"/>
+                <a16:creationId xmlns:a16="http://schemas.microsoft.com/office/drawing/2014/main" xmlns="" id="{9614727F-E6ED-474F-80C1-1AA9A1F473B9}"/>
               </a:ext>
             </a:extLst>
           </p:cNvPr>
@@ -23302,7 +23302,7 @@
           <p:cNvPr id="35" name="TextBox 34">
             <a:extLst>
               <a:ext uri="{FF2B5EF4-FFF2-40B4-BE49-F238E27FC236}">
-                <a16:creationId xmlns="" xmlns:a16="http://schemas.microsoft.com/office/drawing/2014/main" id="{9614727F-E6ED-474F-80C1-1AA9A1F473B9}"/>
+                <a16:creationId xmlns:a16="http://schemas.microsoft.com/office/drawing/2014/main" xmlns="" id="{9614727F-E6ED-474F-80C1-1AA9A1F473B9}"/>
               </a:ext>
             </a:extLst>
           </p:cNvPr>
@@ -24200,7 +24200,7 @@
           <p:cNvPr id="38" name="Rectangle 37">
             <a:extLst>
               <a:ext uri="{FF2B5EF4-FFF2-40B4-BE49-F238E27FC236}">
-                <a16:creationId xmlns="" xmlns:a16="http://schemas.microsoft.com/office/drawing/2014/main" id="{DECD64ED-2EB5-4FAE-A047-C55E50A44E94}"/>
+                <a16:creationId xmlns:a16="http://schemas.microsoft.com/office/drawing/2014/main" xmlns="" id="{DECD64ED-2EB5-4FAE-A047-C55E50A44E94}"/>
               </a:ext>
             </a:extLst>
           </p:cNvPr>
@@ -25160,7 +25160,7 @@
           <p:cNvPr id="2" name="Rectangle 1">
             <a:extLst>
               <a:ext uri="{FF2B5EF4-FFF2-40B4-BE49-F238E27FC236}">
-                <a16:creationId xmlns="" xmlns:a16="http://schemas.microsoft.com/office/drawing/2014/main" id="{CA364A75-3D3C-48F9-BBA1-0A769E0EFC73}"/>
+                <a16:creationId xmlns:a16="http://schemas.microsoft.com/office/drawing/2014/main" xmlns="" id="{CA364A75-3D3C-48F9-BBA1-0A769E0EFC73}"/>
               </a:ext>
             </a:extLst>
           </p:cNvPr>
@@ -25220,7 +25220,7 @@
           <p:cNvPr id="7" name="TextBox 6">
             <a:extLst>
               <a:ext uri="{FF2B5EF4-FFF2-40B4-BE49-F238E27FC236}">
-                <a16:creationId xmlns="" xmlns:a16="http://schemas.microsoft.com/office/drawing/2014/main" id="{71BDB29D-17E2-4739-92FD-E1A75FCDB4F0}"/>
+                <a16:creationId xmlns:a16="http://schemas.microsoft.com/office/drawing/2014/main" xmlns="" id="{71BDB29D-17E2-4739-92FD-E1A75FCDB4F0}"/>
               </a:ext>
             </a:extLst>
           </p:cNvPr>
@@ -25310,7 +25310,7 @@
           <p:cNvPr id="8" name="Rectangle 7">
             <a:extLst>
               <a:ext uri="{FF2B5EF4-FFF2-40B4-BE49-F238E27FC236}">
-                <a16:creationId xmlns="" xmlns:a16="http://schemas.microsoft.com/office/drawing/2014/main" id="{DDA2B91B-6CD9-4AB5-895B-543CC60CBC13}"/>
+                <a16:creationId xmlns:a16="http://schemas.microsoft.com/office/drawing/2014/main" xmlns="" id="{DDA2B91B-6CD9-4AB5-895B-543CC60CBC13}"/>
               </a:ext>
             </a:extLst>
           </p:cNvPr>
@@ -25415,7 +25415,7 @@
           <p:cNvPr id="30" name="Rectangle 29">
             <a:extLst>
               <a:ext uri="{FF2B5EF4-FFF2-40B4-BE49-F238E27FC236}">
-                <a16:creationId xmlns="" xmlns:a16="http://schemas.microsoft.com/office/drawing/2014/main" id="{DECD64ED-2EB5-4FAE-A047-C55E50A44E94}"/>
+                <a16:creationId xmlns:a16="http://schemas.microsoft.com/office/drawing/2014/main" xmlns="" id="{DECD64ED-2EB5-4FAE-A047-C55E50A44E94}"/>
               </a:ext>
             </a:extLst>
           </p:cNvPr>
@@ -26427,7 +26427,7 @@
           <p:cNvPr id="33" name="Rectangle 32">
             <a:extLst>
               <a:ext uri="{FF2B5EF4-FFF2-40B4-BE49-F238E27FC236}">
-                <a16:creationId xmlns="" xmlns:a16="http://schemas.microsoft.com/office/drawing/2014/main" id="{DDA2B91B-6CD9-4AB5-895B-543CC60CBC13}"/>
+                <a16:creationId xmlns:a16="http://schemas.microsoft.com/office/drawing/2014/main" xmlns="" id="{DDA2B91B-6CD9-4AB5-895B-543CC60CBC13}"/>
               </a:ext>
             </a:extLst>
           </p:cNvPr>
@@ -26478,7 +26478,7 @@
           <p:cNvPr id="34" name="Rectangle 33">
             <a:extLst>
               <a:ext uri="{FF2B5EF4-FFF2-40B4-BE49-F238E27FC236}">
-                <a16:creationId xmlns="" xmlns:a16="http://schemas.microsoft.com/office/drawing/2014/main" id="{DDA2B91B-6CD9-4AB5-895B-543CC60CBC13}"/>
+                <a16:creationId xmlns:a16="http://schemas.microsoft.com/office/drawing/2014/main" xmlns="" id="{DDA2B91B-6CD9-4AB5-895B-543CC60CBC13}"/>
               </a:ext>
             </a:extLst>
           </p:cNvPr>
@@ -26535,7 +26535,7 @@
           <p:cNvPr id="35" name="Rectangle 34">
             <a:extLst>
               <a:ext uri="{FF2B5EF4-FFF2-40B4-BE49-F238E27FC236}">
-                <a16:creationId xmlns="" xmlns:a16="http://schemas.microsoft.com/office/drawing/2014/main" id="{DDA2B91B-6CD9-4AB5-895B-543CC60CBC13}"/>
+                <a16:creationId xmlns:a16="http://schemas.microsoft.com/office/drawing/2014/main" xmlns="" id="{DDA2B91B-6CD9-4AB5-895B-543CC60CBC13}"/>
               </a:ext>
             </a:extLst>
           </p:cNvPr>
@@ -26592,7 +26592,7 @@
           <p:cNvPr id="36" name="Rectangle 35">
             <a:extLst>
               <a:ext uri="{FF2B5EF4-FFF2-40B4-BE49-F238E27FC236}">
-                <a16:creationId xmlns="" xmlns:a16="http://schemas.microsoft.com/office/drawing/2014/main" id="{DDA2B91B-6CD9-4AB5-895B-543CC60CBC13}"/>
+                <a16:creationId xmlns:a16="http://schemas.microsoft.com/office/drawing/2014/main" xmlns="" id="{DDA2B91B-6CD9-4AB5-895B-543CC60CBC13}"/>
               </a:ext>
             </a:extLst>
           </p:cNvPr>
@@ -26741,7 +26741,7 @@
           <p:cNvPr id="46" name="Rectangle 45">
             <a:extLst>
               <a:ext uri="{FF2B5EF4-FFF2-40B4-BE49-F238E27FC236}">
-                <a16:creationId xmlns="" xmlns:a16="http://schemas.microsoft.com/office/drawing/2014/main" id="{CA364A75-3D3C-48F9-BBA1-0A769E0EFC73}"/>
+                <a16:creationId xmlns:a16="http://schemas.microsoft.com/office/drawing/2014/main" xmlns="" id="{CA364A75-3D3C-48F9-BBA1-0A769E0EFC73}"/>
               </a:ext>
             </a:extLst>
           </p:cNvPr>
@@ -27501,7 +27501,7 @@
           <p:cNvPr id="7" name="TextBox 6">
             <a:extLst>
               <a:ext uri="{FF2B5EF4-FFF2-40B4-BE49-F238E27FC236}">
-                <a16:creationId xmlns="" xmlns:a16="http://schemas.microsoft.com/office/drawing/2014/main" id="{06E09994-655D-48E9-9C95-88028DBE2A14}"/>
+                <a16:creationId xmlns:a16="http://schemas.microsoft.com/office/drawing/2014/main" xmlns="" id="{06E09994-655D-48E9-9C95-88028DBE2A14}"/>
               </a:ext>
             </a:extLst>
           </p:cNvPr>
@@ -27557,7 +27557,7 @@
           <p:cNvPr id="9" name="Rectangle 8">
             <a:extLst>
               <a:ext uri="{FF2B5EF4-FFF2-40B4-BE49-F238E27FC236}">
-                <a16:creationId xmlns="" xmlns:a16="http://schemas.microsoft.com/office/drawing/2014/main" id="{DDA2B91B-6CD9-4AB5-895B-543CC60CBC13}"/>
+                <a16:creationId xmlns:a16="http://schemas.microsoft.com/office/drawing/2014/main" xmlns="" id="{DDA2B91B-6CD9-4AB5-895B-543CC60CBC13}"/>
               </a:ext>
             </a:extLst>
           </p:cNvPr>
@@ -27608,7 +27608,7 @@
           <p:cNvPr id="10" name="Rectangle 9">
             <a:extLst>
               <a:ext uri="{FF2B5EF4-FFF2-40B4-BE49-F238E27FC236}">
-                <a16:creationId xmlns="" xmlns:a16="http://schemas.microsoft.com/office/drawing/2014/main" id="{DECD64ED-2EB5-4FAE-A047-C55E50A44E94}"/>
+                <a16:creationId xmlns:a16="http://schemas.microsoft.com/office/drawing/2014/main" xmlns="" id="{DECD64ED-2EB5-4FAE-A047-C55E50A44E94}"/>
               </a:ext>
             </a:extLst>
           </p:cNvPr>
@@ -27666,7 +27666,7 @@
           <p:cNvPr id="11" name="Rectangle 10">
             <a:extLst>
               <a:ext uri="{FF2B5EF4-FFF2-40B4-BE49-F238E27FC236}">
-                <a16:creationId xmlns="" xmlns:a16="http://schemas.microsoft.com/office/drawing/2014/main" id="{DDA2B91B-6CD9-4AB5-895B-543CC60CBC13}"/>
+                <a16:creationId xmlns:a16="http://schemas.microsoft.com/office/drawing/2014/main" xmlns="" id="{DDA2B91B-6CD9-4AB5-895B-543CC60CBC13}"/>
               </a:ext>
             </a:extLst>
           </p:cNvPr>
@@ -27746,7 +27746,7 @@
           <p:cNvPr id="8" name="Freeform 93">
             <a:extLst>
               <a:ext uri="{FF2B5EF4-FFF2-40B4-BE49-F238E27FC236}">
-                <a16:creationId xmlns="" xmlns:a16="http://schemas.microsoft.com/office/drawing/2014/main" id="{143BE668-13BB-4A16-9843-2910254F24FB}"/>
+                <a16:creationId xmlns:a16="http://schemas.microsoft.com/office/drawing/2014/main" xmlns="" id="{143BE668-13BB-4A16-9843-2910254F24FB}"/>
               </a:ext>
             </a:extLst>
           </p:cNvPr>
@@ -28114,6 +28114,47 @@
           </a:p>
         </p:txBody>
       </p:sp>
+      <p:pic>
+        <p:nvPicPr>
+          <p:cNvPr id="12" name="Picture 2" descr="C:\Users\Pixelart\Desktop\Update_Aug 18\AI Programming\_Design\waterMarkIcon.png"/>
+          <p:cNvPicPr>
+            <a:picLocks noChangeAspect="1" noChangeArrowheads="1"/>
+          </p:cNvPicPr>
+          <p:nvPr/>
+        </p:nvPicPr>
+        <p:blipFill>
+          <a:blip r:embed="rId3" cstate="print">
+            <a:extLst>
+              <a:ext uri="{28A0092B-C50C-407E-A947-70E740481C1C}">
+                <a14:useLocalDpi xmlns:a14="http://schemas.microsoft.com/office/drawing/2010/main" val="0"/>
+              </a:ext>
+            </a:extLst>
+          </a:blip>
+          <a:srcRect/>
+          <a:stretch>
+            <a:fillRect/>
+          </a:stretch>
+        </p:blipFill>
+        <p:spPr bwMode="auto">
+          <a:xfrm>
+            <a:off x="355137" y="6222206"/>
+            <a:ext cx="635794" cy="635794"/>
+          </a:xfrm>
+          <a:prstGeom prst="rect">
+            <a:avLst/>
+          </a:prstGeom>
+          <a:noFill/>
+          <a:extLst>
+            <a:ext uri="{909E8E84-426E-40DD-AFC4-6F175D3DCCD1}">
+              <a14:hiddenFill xmlns:a14="http://schemas.microsoft.com/office/drawing/2010/main">
+                <a:solidFill>
+                  <a:srgbClr val="FFFFFF"/>
+                </a:solidFill>
+              </a14:hiddenFill>
+            </a:ext>
+          </a:extLst>
+        </p:spPr>
+      </p:pic>
     </p:spTree>
     <p:extLst>
       <p:ext uri="{BB962C8B-B14F-4D97-AF65-F5344CB8AC3E}">
@@ -28539,7 +28580,7 @@
           <p:cNvPr id="14" name="7 CuadroTexto">
             <a:extLst>
               <a:ext uri="{FF2B5EF4-FFF2-40B4-BE49-F238E27FC236}">
-                <a16:creationId xmlns="" xmlns:a16="http://schemas.microsoft.com/office/drawing/2014/main" id="{2A3771CF-C9F1-4B5C-8B5E-DDFAE8235054}"/>
+                <a16:creationId xmlns:a16="http://schemas.microsoft.com/office/drawing/2014/main" xmlns="" id="{2A3771CF-C9F1-4B5C-8B5E-DDFAE8235054}"/>
               </a:ext>
             </a:extLst>
           </p:cNvPr>
@@ -28610,7 +28651,7 @@
           <p:cNvPr id="9" name="Freeform 93">
             <a:extLst>
               <a:ext uri="{FF2B5EF4-FFF2-40B4-BE49-F238E27FC236}">
-                <a16:creationId xmlns="" xmlns:a16="http://schemas.microsoft.com/office/drawing/2014/main" id="{143BE668-13BB-4A16-9843-2910254F24FB}"/>
+                <a16:creationId xmlns:a16="http://schemas.microsoft.com/office/drawing/2014/main" xmlns="" id="{143BE668-13BB-4A16-9843-2910254F24FB}"/>
               </a:ext>
             </a:extLst>
           </p:cNvPr>
@@ -28983,7 +29024,7 @@
           <p:cNvPr id="29" name="TextBox 28">
             <a:extLst>
               <a:ext uri="{FF2B5EF4-FFF2-40B4-BE49-F238E27FC236}">
-                <a16:creationId xmlns="" xmlns:a16="http://schemas.microsoft.com/office/drawing/2014/main" id="{9614727F-E6ED-474F-80C1-1AA9A1F473B9}"/>
+                <a16:creationId xmlns:a16="http://schemas.microsoft.com/office/drawing/2014/main" xmlns="" id="{9614727F-E6ED-474F-80C1-1AA9A1F473B9}"/>
               </a:ext>
             </a:extLst>
           </p:cNvPr>
@@ -29066,7 +29107,7 @@
           <p:cNvPr id="33" name="7 CuadroTexto">
             <a:extLst>
               <a:ext uri="{FF2B5EF4-FFF2-40B4-BE49-F238E27FC236}">
-                <a16:creationId xmlns="" xmlns:a16="http://schemas.microsoft.com/office/drawing/2014/main" id="{2A3771CF-C9F1-4B5C-8B5E-DDFAE8235054}"/>
+                <a16:creationId xmlns:a16="http://schemas.microsoft.com/office/drawing/2014/main" xmlns="" id="{2A3771CF-C9F1-4B5C-8B5E-DDFAE8235054}"/>
               </a:ext>
             </a:extLst>
           </p:cNvPr>
@@ -29199,7 +29240,7 @@
           <p:cNvPr id="34" name="TextBox 33">
             <a:extLst>
               <a:ext uri="{FF2B5EF4-FFF2-40B4-BE49-F238E27FC236}">
-                <a16:creationId xmlns="" xmlns:a16="http://schemas.microsoft.com/office/drawing/2014/main" id="{9614727F-E6ED-474F-80C1-1AA9A1F473B9}"/>
+                <a16:creationId xmlns:a16="http://schemas.microsoft.com/office/drawing/2014/main" xmlns="" id="{9614727F-E6ED-474F-80C1-1AA9A1F473B9}"/>
               </a:ext>
             </a:extLst>
           </p:cNvPr>
@@ -29255,7 +29296,7 @@
           <p:cNvPr id="38" name="Rectangle 37">
             <a:extLst>
               <a:ext uri="{FF2B5EF4-FFF2-40B4-BE49-F238E27FC236}">
-                <a16:creationId xmlns="" xmlns:a16="http://schemas.microsoft.com/office/drawing/2014/main" id="{DECD64ED-2EB5-4FAE-A047-C55E50A44E94}"/>
+                <a16:creationId xmlns:a16="http://schemas.microsoft.com/office/drawing/2014/main" xmlns="" id="{DECD64ED-2EB5-4FAE-A047-C55E50A44E94}"/>
               </a:ext>
             </a:extLst>
           </p:cNvPr>
@@ -29351,7 +29392,7 @@
       </p:pic>
       <p:pic>
         <p:nvPicPr>
-          <p:cNvPr id="6146" name="Picture 2" descr="C:\Users\Pixelart\Downloads\Compressed\_Mockup\_small\iphone-mockup-2.png"/>
+          <p:cNvPr id="1026" name="Picture 2" descr="https://lh4.googleusercontent.com/TX-dtU1BsS6YEFV0MVPDBILXtk9dw-tdjn3mdpOmhe3WUyPrbmDJ077HEAlrXu5iQv_ocH1p1aoewkWGqOr09hcFL51vNd0m-Q1h2L8TC1Okuzow45vubwU1Igx-MxIwpuVEnEEKEQg"/>
           <p:cNvPicPr>
             <a:picLocks noChangeAspect="1" noChangeArrowheads="1"/>
           </p:cNvPicPr>
@@ -29372,8 +29413,8 @@
         </p:blipFill>
         <p:spPr bwMode="auto">
           <a:xfrm>
-            <a:off x="419495" y="1657393"/>
-            <a:ext cx="4487242" cy="4342492"/>
+            <a:off x="460999" y="1965230"/>
+            <a:ext cx="4921884" cy="4192527"/>
           </a:xfrm>
           <a:prstGeom prst="rect">
             <a:avLst/>
@@ -29424,7 +29465,7 @@
                             </p:stCondLst>
                             <p:childTnLst>
                               <p:par>
-                                <p:cTn id="5" presetID="42" presetClass="entr" presetSubtype="0" fill="hold" nodeType="afterEffect">
+                                <p:cTn id="5" presetID="2" presetClass="entr" presetSubtype="1" fill="hold" grpId="0" nodeType="afterEffect">
                                   <p:stCondLst>
                                     <p:cond delay="0"/>
                                   </p:stCondLst>
@@ -29432,96 +29473,6 @@
                                     <p:set>
                                       <p:cBhvr>
                                         <p:cTn id="6" dur="1" fill="hold">
-                                          <p:stCondLst>
-                                            <p:cond delay="0"/>
-                                          </p:stCondLst>
-                                        </p:cTn>
-                                        <p:tgtEl>
-                                          <p:spTgt spid="6146"/>
-                                        </p:tgtEl>
-                                        <p:attrNameLst>
-                                          <p:attrName>style.visibility</p:attrName>
-                                        </p:attrNameLst>
-                                      </p:cBhvr>
-                                      <p:to>
-                                        <p:strVal val="visible"/>
-                                      </p:to>
-                                    </p:set>
-                                    <p:animEffect transition="in" filter="fade">
-                                      <p:cBhvr>
-                                        <p:cTn id="7" dur="300"/>
-                                        <p:tgtEl>
-                                          <p:spTgt spid="6146"/>
-                                        </p:tgtEl>
-                                      </p:cBhvr>
-                                    </p:animEffect>
-                                    <p:anim calcmode="lin" valueType="num">
-                                      <p:cBhvr>
-                                        <p:cTn id="8" dur="300" fill="hold"/>
-                                        <p:tgtEl>
-                                          <p:spTgt spid="6146"/>
-                                        </p:tgtEl>
-                                        <p:attrNameLst>
-                                          <p:attrName>ppt_x</p:attrName>
-                                        </p:attrNameLst>
-                                      </p:cBhvr>
-                                      <p:tavLst>
-                                        <p:tav tm="0">
-                                          <p:val>
-                                            <p:strVal val="#ppt_x"/>
-                                          </p:val>
-                                        </p:tav>
-                                        <p:tav tm="100000">
-                                          <p:val>
-                                            <p:strVal val="#ppt_x"/>
-                                          </p:val>
-                                        </p:tav>
-                                      </p:tavLst>
-                                    </p:anim>
-                                    <p:anim calcmode="lin" valueType="num">
-                                      <p:cBhvr>
-                                        <p:cTn id="9" dur="300" fill="hold"/>
-                                        <p:tgtEl>
-                                          <p:spTgt spid="6146"/>
-                                        </p:tgtEl>
-                                        <p:attrNameLst>
-                                          <p:attrName>ppt_y</p:attrName>
-                                        </p:attrNameLst>
-                                      </p:cBhvr>
-                                      <p:tavLst>
-                                        <p:tav tm="0">
-                                          <p:val>
-                                            <p:strVal val="#ppt_y+.1"/>
-                                          </p:val>
-                                        </p:tav>
-                                        <p:tav tm="100000">
-                                          <p:val>
-                                            <p:strVal val="#ppt_y"/>
-                                          </p:val>
-                                        </p:tav>
-                                      </p:tavLst>
-                                    </p:anim>
-                                  </p:childTnLst>
-                                </p:cTn>
-                              </p:par>
-                            </p:childTnLst>
-                          </p:cTn>
-                        </p:par>
-                        <p:par>
-                          <p:cTn id="10" fill="hold">
-                            <p:stCondLst>
-                              <p:cond delay="300"/>
-                            </p:stCondLst>
-                            <p:childTnLst>
-                              <p:par>
-                                <p:cTn id="11" presetID="2" presetClass="entr" presetSubtype="1" fill="hold" grpId="0" nodeType="afterEffect">
-                                  <p:stCondLst>
-                                    <p:cond delay="0"/>
-                                  </p:stCondLst>
-                                  <p:childTnLst>
-                                    <p:set>
-                                      <p:cBhvr>
-                                        <p:cTn id="12" dur="1" fill="hold">
                                           <p:stCondLst>
                                             <p:cond delay="0"/>
                                           </p:stCondLst>
@@ -29539,7 +29490,7 @@
                                     </p:set>
                                     <p:anim calcmode="lin" valueType="num">
                                       <p:cBhvr additive="base">
-                                        <p:cTn id="13" dur="300" fill="hold"/>
+                                        <p:cTn id="7" dur="300" fill="hold"/>
                                         <p:tgtEl>
                                           <p:spTgt spid="9"/>
                                         </p:tgtEl>
@@ -29562,7 +29513,7 @@
                                     </p:anim>
                                     <p:anim calcmode="lin" valueType="num">
                                       <p:cBhvr additive="base">
-                                        <p:cTn id="14" dur="300" fill="hold"/>
+                                        <p:cTn id="8" dur="300" fill="hold"/>
                                         <p:tgtEl>
                                           <p:spTgt spid="9"/>
                                         </p:tgtEl>
@@ -29590,20 +29541,20 @@
                           </p:cTn>
                         </p:par>
                         <p:par>
-                          <p:cTn id="15" fill="hold">
+                          <p:cTn id="9" fill="hold">
                             <p:stCondLst>
-                              <p:cond delay="600"/>
+                              <p:cond delay="300"/>
                             </p:stCondLst>
                             <p:childTnLst>
                               <p:par>
-                                <p:cTn id="16" presetID="42" presetClass="entr" presetSubtype="0" fill="hold" grpId="0" nodeType="afterEffect">
+                                <p:cTn id="10" presetID="42" presetClass="entr" presetSubtype="0" fill="hold" grpId="0" nodeType="afterEffect">
                                   <p:stCondLst>
                                     <p:cond delay="0"/>
                                   </p:stCondLst>
                                   <p:childTnLst>
                                     <p:set>
                                       <p:cBhvr>
-                                        <p:cTn id="17" dur="1" fill="hold">
+                                        <p:cTn id="11" dur="1" fill="hold">
                                           <p:stCondLst>
                                             <p:cond delay="0"/>
                                           </p:stCondLst>
@@ -29621,7 +29572,7 @@
                                     </p:set>
                                     <p:animEffect transition="in" filter="fade">
                                       <p:cBhvr>
-                                        <p:cTn id="18" dur="500"/>
+                                        <p:cTn id="12" dur="500"/>
                                         <p:tgtEl>
                                           <p:spTgt spid="29"/>
                                         </p:tgtEl>
@@ -29629,7 +29580,7 @@
                                     </p:animEffect>
                                     <p:anim calcmode="lin" valueType="num">
                                       <p:cBhvr>
-                                        <p:cTn id="19" dur="500" fill="hold"/>
+                                        <p:cTn id="13" dur="500" fill="hold"/>
                                         <p:tgtEl>
                                           <p:spTgt spid="29"/>
                                         </p:tgtEl>
@@ -29652,9 +29603,99 @@
                                     </p:anim>
                                     <p:anim calcmode="lin" valueType="num">
                                       <p:cBhvr>
-                                        <p:cTn id="20" dur="500" fill="hold"/>
+                                        <p:cTn id="14" dur="500" fill="hold"/>
                                         <p:tgtEl>
                                           <p:spTgt spid="29"/>
+                                        </p:tgtEl>
+                                        <p:attrNameLst>
+                                          <p:attrName>ppt_y</p:attrName>
+                                        </p:attrNameLst>
+                                      </p:cBhvr>
+                                      <p:tavLst>
+                                        <p:tav tm="0">
+                                          <p:val>
+                                            <p:strVal val="#ppt_y+.1"/>
+                                          </p:val>
+                                        </p:tav>
+                                        <p:tav tm="100000">
+                                          <p:val>
+                                            <p:strVal val="#ppt_y"/>
+                                          </p:val>
+                                        </p:tav>
+                                      </p:tavLst>
+                                    </p:anim>
+                                  </p:childTnLst>
+                                </p:cTn>
+                              </p:par>
+                            </p:childTnLst>
+                          </p:cTn>
+                        </p:par>
+                        <p:par>
+                          <p:cTn id="15" fill="hold">
+                            <p:stCondLst>
+                              <p:cond delay="800"/>
+                            </p:stCondLst>
+                            <p:childTnLst>
+                              <p:par>
+                                <p:cTn id="16" presetID="42" presetClass="entr" presetSubtype="0" fill="hold" grpId="0" nodeType="afterEffect">
+                                  <p:stCondLst>
+                                    <p:cond delay="0"/>
+                                  </p:stCondLst>
+                                  <p:childTnLst>
+                                    <p:set>
+                                      <p:cBhvr>
+                                        <p:cTn id="17" dur="1" fill="hold">
+                                          <p:stCondLst>
+                                            <p:cond delay="0"/>
+                                          </p:stCondLst>
+                                        </p:cTn>
+                                        <p:tgtEl>
+                                          <p:spTgt spid="34"/>
+                                        </p:tgtEl>
+                                        <p:attrNameLst>
+                                          <p:attrName>style.visibility</p:attrName>
+                                        </p:attrNameLst>
+                                      </p:cBhvr>
+                                      <p:to>
+                                        <p:strVal val="visible"/>
+                                      </p:to>
+                                    </p:set>
+                                    <p:animEffect transition="in" filter="fade">
+                                      <p:cBhvr>
+                                        <p:cTn id="18" dur="300"/>
+                                        <p:tgtEl>
+                                          <p:spTgt spid="34"/>
+                                        </p:tgtEl>
+                                      </p:cBhvr>
+                                    </p:animEffect>
+                                    <p:anim calcmode="lin" valueType="num">
+                                      <p:cBhvr>
+                                        <p:cTn id="19" dur="300" fill="hold"/>
+                                        <p:tgtEl>
+                                          <p:spTgt spid="34"/>
+                                        </p:tgtEl>
+                                        <p:attrNameLst>
+                                          <p:attrName>ppt_x</p:attrName>
+                                        </p:attrNameLst>
+                                      </p:cBhvr>
+                                      <p:tavLst>
+                                        <p:tav tm="0">
+                                          <p:val>
+                                            <p:strVal val="#ppt_x"/>
+                                          </p:val>
+                                        </p:tav>
+                                        <p:tav tm="100000">
+                                          <p:val>
+                                            <p:strVal val="#ppt_x"/>
+                                          </p:val>
+                                        </p:tav>
+                                      </p:tavLst>
+                                    </p:anim>
+                                    <p:anim calcmode="lin" valueType="num">
+                                      <p:cBhvr>
+                                        <p:cTn id="20" dur="300" fill="hold"/>
+                                        <p:tgtEl>
+                                          <p:spTgt spid="34"/>
                                         </p:tgtEl>
                                         <p:attrNameLst>
                                           <p:attrName>ppt_y</p:attrName>
@@ -29686,7 +29727,7 @@
                             </p:stCondLst>
                             <p:childTnLst>
                               <p:par>
-                                <p:cTn id="22" presetID="42" presetClass="entr" presetSubtype="0" fill="hold" grpId="0" nodeType="afterEffect">
+                                <p:cTn id="22" presetID="10" presetClass="entr" presetSubtype="0" fill="hold" grpId="0" nodeType="afterEffect">
                                   <p:stCondLst>
                                     <p:cond delay="0"/>
                                   </p:stCondLst>
@@ -29699,7 +29740,7 @@
                                           </p:stCondLst>
                                         </p:cTn>
                                         <p:tgtEl>
-                                          <p:spTgt spid="34"/>
+                                          <p:spTgt spid="14"/>
                                         </p:tgtEl>
                                         <p:attrNameLst>
                                           <p:attrName>style.visibility</p:attrName>
@@ -29713,15 +29754,51 @@
                                       <p:cBhvr>
                                         <p:cTn id="24" dur="300"/>
                                         <p:tgtEl>
-                                          <p:spTgt spid="34"/>
+                                          <p:spTgt spid="14"/>
                                         </p:tgtEl>
                                       </p:cBhvr>
                                     </p:animEffect>
+                                  </p:childTnLst>
+                                </p:cTn>
+                              </p:par>
+                            </p:childTnLst>
+                          </p:cTn>
+                        </p:par>
+                        <p:par>
+                          <p:cTn id="25" fill="hold">
+                            <p:stCondLst>
+                              <p:cond delay="1400"/>
+                            </p:stCondLst>
+                            <p:childTnLst>
+                              <p:par>
+                                <p:cTn id="26" presetID="2" presetClass="entr" presetSubtype="4" fill="hold" nodeType="afterEffect">
+                                  <p:stCondLst>
+                                    <p:cond delay="0"/>
+                                  </p:stCondLst>
+                                  <p:childTnLst>
+                                    <p:set>
+                                      <p:cBhvr>
+                                        <p:cTn id="27" dur="1" fill="hold">
+                                          <p:stCondLst>
+                                            <p:cond delay="0"/>
+                                          </p:stCondLst>
+                                        </p:cTn>
+                                        <p:tgtEl>
+                                          <p:spTgt spid="1026"/>
+                                        </p:tgtEl>
+                                        <p:attrNameLst>
+                                          <p:attrName>style.visibility</p:attrName>
+                                        </p:attrNameLst>
+                                      </p:cBhvr>
+                                      <p:to>
+                                        <p:strVal val="visible"/>
+                                      </p:to>
+                                    </p:set>
                                     <p:anim calcmode="lin" valueType="num">
-                                      <p:cBhvr>
-                                        <p:cTn id="25" dur="300" fill="hold"/>
+                                      <p:cBhvr additive="base">
+                                        <p:cTn id="28" dur="300" fill="hold"/>
                                         <p:tgtEl>
-                                          <p:spTgt spid="34"/>
+                                          <p:spTgt spid="1026"/>
                                         </p:tgtEl>
                                         <p:attrNameLst>
                                           <p:attrName>ppt_x</p:attrName>
@@ -29741,10 +29818,10 @@
                                       </p:tavLst>
                                     </p:anim>
                                     <p:anim calcmode="lin" valueType="num">
-                                      <p:cBhvr>
-                                        <p:cTn id="26" dur="300" fill="hold"/>
+                                      <p:cBhvr additive="base">
+                                        <p:cTn id="29" dur="300" fill="hold"/>
                                         <p:tgtEl>
-                                          <p:spTgt spid="34"/>
+                                          <p:spTgt spid="1026"/>
                                         </p:tgtEl>
                                         <p:attrNameLst>
                                           <p:attrName>ppt_y</p:attrName>
@@ -29753,7 +29830,7 @@
                                       <p:tavLst>
                                         <p:tav tm="0">
                                           <p:val>
-                                            <p:strVal val="#ppt_y+.1"/>
+                                            <p:strVal val="1+#ppt_h/2"/>
                                           </p:val>
                                         </p:tav>
                                         <p:tav tm="100000">
@@ -29770,64 +29847,20 @@
                           </p:cTn>
                         </p:par>
                         <p:par>
-                          <p:cTn id="27" fill="hold">
+                          <p:cTn id="30" fill="hold">
                             <p:stCondLst>
-                              <p:cond delay="1400"/>
+                              <p:cond delay="1700"/>
                             </p:stCondLst>
                             <p:childTnLst>
                               <p:par>
-                                <p:cTn id="28" presetID="10" presetClass="entr" presetSubtype="0" fill="hold" grpId="0" nodeType="afterEffect">
+                                <p:cTn id="31" presetID="10" presetClass="entr" presetSubtype="0" fill="hold" grpId="0" nodeType="afterEffect">
                                   <p:stCondLst>
                                     <p:cond delay="0"/>
                                   </p:stCondLst>
                                   <p:childTnLst>
                                     <p:set>
                                       <p:cBhvr>
-                                        <p:cTn id="29" dur="1" fill="hold">
-                                          <p:stCondLst>
-                                            <p:cond delay="0"/>
-                                          </p:stCondLst>
-                                        </p:cTn>
-                                        <p:tgtEl>
-                                          <p:spTgt spid="14"/>
-                                        </p:tgtEl>
-                                        <p:attrNameLst>
-                                          <p:attrName>style.visibility</p:attrName>
-                                        </p:attrNameLst>
-                                      </p:cBhvr>
-                                      <p:to>
-                                        <p:strVal val="visible"/>
-                                      </p:to>
-                                    </p:set>
-                                    <p:animEffect transition="in" filter="fade">
-                                      <p:cBhvr>
-                                        <p:cTn id="30" dur="300"/>
-                                        <p:tgtEl>
-                                          <p:spTgt spid="14"/>
-                                        </p:tgtEl>
-                                      </p:cBhvr>
-                                    </p:animEffect>
-                                  </p:childTnLst>
-                                </p:cTn>
-                              </p:par>
-                            </p:childTnLst>
-                          </p:cTn>
-                        </p:par>
-                        <p:par>
-                          <p:cTn id="31" fill="hold">
-                            <p:stCondLst>
-                              <p:cond delay="1700"/>
-                            </p:stCondLst>
-                            <p:childTnLst>
-                              <p:par>
-                                <p:cTn id="32" presetID="10" presetClass="entr" presetSubtype="0" fill="hold" grpId="0" nodeType="afterEffect">
-                                  <p:stCondLst>
-                                    <p:cond delay="0"/>
-                                  </p:stCondLst>
-                                  <p:childTnLst>
-                                    <p:set>
-                                      <p:cBhvr>
-                                        <p:cTn id="33" dur="1" fill="hold">
+                                        <p:cTn id="32" dur="1" fill="hold">
                                           <p:stCondLst>
                                             <p:cond delay="0"/>
                                           </p:stCondLst>
@@ -29845,7 +29878,7 @@
                                     </p:set>
                                     <p:animEffect transition="in" filter="fade">
                                       <p:cBhvr>
-                                        <p:cTn id="34" dur="200"/>
+                                        <p:cTn id="33" dur="200"/>
                                         <p:tgtEl>
                                           <p:spTgt spid="33"/>
                                         </p:tgtEl>
@@ -29914,7 +29947,7 @@
           <p:cNvPr id="9" name="Freeform 93">
             <a:extLst>
               <a:ext uri="{FF2B5EF4-FFF2-40B4-BE49-F238E27FC236}">
-                <a16:creationId xmlns="" xmlns:a16="http://schemas.microsoft.com/office/drawing/2014/main" id="{143BE668-13BB-4A16-9843-2910254F24FB}"/>
+                <a16:creationId xmlns:a16="http://schemas.microsoft.com/office/drawing/2014/main" xmlns="" id="{143BE668-13BB-4A16-9843-2910254F24FB}"/>
               </a:ext>
             </a:extLst>
           </p:cNvPr>
@@ -30287,7 +30320,7 @@
           <p:cNvPr id="29" name="TextBox 28">
             <a:extLst>
               <a:ext uri="{FF2B5EF4-FFF2-40B4-BE49-F238E27FC236}">
-                <a16:creationId xmlns="" xmlns:a16="http://schemas.microsoft.com/office/drawing/2014/main" id="{9614727F-E6ED-474F-80C1-1AA9A1F473B9}"/>
+                <a16:creationId xmlns:a16="http://schemas.microsoft.com/office/drawing/2014/main" xmlns="" id="{9614727F-E6ED-474F-80C1-1AA9A1F473B9}"/>
               </a:ext>
             </a:extLst>
           </p:cNvPr>
@@ -30359,7 +30392,7 @@
           <p:cNvPr id="33" name="7 CuadroTexto">
             <a:extLst>
               <a:ext uri="{FF2B5EF4-FFF2-40B4-BE49-F238E27FC236}">
-                <a16:creationId xmlns="" xmlns:a16="http://schemas.microsoft.com/office/drawing/2014/main" id="{2A3771CF-C9F1-4B5C-8B5E-DDFAE8235054}"/>
+                <a16:creationId xmlns:a16="http://schemas.microsoft.com/office/drawing/2014/main" xmlns="" id="{2A3771CF-C9F1-4B5C-8B5E-DDFAE8235054}"/>
               </a:ext>
             </a:extLst>
           </p:cNvPr>
@@ -30518,7 +30551,7 @@
           <p:cNvPr id="35" name="TextBox 34">
             <a:extLst>
               <a:ext uri="{FF2B5EF4-FFF2-40B4-BE49-F238E27FC236}">
-                <a16:creationId xmlns="" xmlns:a16="http://schemas.microsoft.com/office/drawing/2014/main" id="{9614727F-E6ED-474F-80C1-1AA9A1F473B9}"/>
+                <a16:creationId xmlns:a16="http://schemas.microsoft.com/office/drawing/2014/main" xmlns="" id="{9614727F-E6ED-474F-80C1-1AA9A1F473B9}"/>
               </a:ext>
             </a:extLst>
           </p:cNvPr>
@@ -30574,7 +30607,7 @@
           <p:cNvPr id="38" name="Rectangle 37">
             <a:extLst>
               <a:ext uri="{FF2B5EF4-FFF2-40B4-BE49-F238E27FC236}">
-                <a16:creationId xmlns="" xmlns:a16="http://schemas.microsoft.com/office/drawing/2014/main" id="{DECD64ED-2EB5-4FAE-A047-C55E50A44E94}"/>
+                <a16:creationId xmlns:a16="http://schemas.microsoft.com/office/drawing/2014/main" xmlns="" id="{DECD64ED-2EB5-4FAE-A047-C55E50A44E94}"/>
               </a:ext>
             </a:extLst>
           </p:cNvPr>
@@ -30714,7 +30747,7 @@
           <p:cNvPr id="12" name="7 CuadroTexto">
             <a:extLst>
               <a:ext uri="{FF2B5EF4-FFF2-40B4-BE49-F238E27FC236}">
-                <a16:creationId xmlns="" xmlns:a16="http://schemas.microsoft.com/office/drawing/2014/main" id="{2A3771CF-C9F1-4B5C-8B5E-DDFAE8235054}"/>
+                <a16:creationId xmlns:a16="http://schemas.microsoft.com/office/drawing/2014/main" xmlns="" id="{2A3771CF-C9F1-4B5C-8B5E-DDFAE8235054}"/>
               </a:ext>
             </a:extLst>
           </p:cNvPr>
@@ -31444,7 +31477,7 @@
           <p:cNvPr id="29" name="TextBox 28">
             <a:extLst>
               <a:ext uri="{FF2B5EF4-FFF2-40B4-BE49-F238E27FC236}">
-                <a16:creationId xmlns="" xmlns:a16="http://schemas.microsoft.com/office/drawing/2014/main" id="{9614727F-E6ED-474F-80C1-1AA9A1F473B9}"/>
+                <a16:creationId xmlns:a16="http://schemas.microsoft.com/office/drawing/2014/main" xmlns="" id="{9614727F-E6ED-474F-80C1-1AA9A1F473B9}"/>
               </a:ext>
             </a:extLst>
           </p:cNvPr>
@@ -31494,7 +31527,7 @@
           <p:cNvPr id="35" name="TextBox 34">
             <a:extLst>
               <a:ext uri="{FF2B5EF4-FFF2-40B4-BE49-F238E27FC236}">
-                <a16:creationId xmlns="" xmlns:a16="http://schemas.microsoft.com/office/drawing/2014/main" id="{9614727F-E6ED-474F-80C1-1AA9A1F473B9}"/>
+                <a16:creationId xmlns:a16="http://schemas.microsoft.com/office/drawing/2014/main" xmlns="" id="{9614727F-E6ED-474F-80C1-1AA9A1F473B9}"/>
               </a:ext>
             </a:extLst>
           </p:cNvPr>
@@ -31550,7 +31583,7 @@
           <p:cNvPr id="38" name="Rectangle 37">
             <a:extLst>
               <a:ext uri="{FF2B5EF4-FFF2-40B4-BE49-F238E27FC236}">
-                <a16:creationId xmlns="" xmlns:a16="http://schemas.microsoft.com/office/drawing/2014/main" id="{DECD64ED-2EB5-4FAE-A047-C55E50A44E94}"/>
+                <a16:creationId xmlns:a16="http://schemas.microsoft.com/office/drawing/2014/main" xmlns="" id="{DECD64ED-2EB5-4FAE-A047-C55E50A44E94}"/>
               </a:ext>
             </a:extLst>
           </p:cNvPr>
@@ -31720,7 +31753,7 @@
           <p:cNvPr id="13" name="TextBox 12">
             <a:extLst>
               <a:ext uri="{FF2B5EF4-FFF2-40B4-BE49-F238E27FC236}">
-                <a16:creationId xmlns="" xmlns:a16="http://schemas.microsoft.com/office/drawing/2014/main" id="{9614727F-E6ED-474F-80C1-1AA9A1F473B9}"/>
+                <a16:creationId xmlns:a16="http://schemas.microsoft.com/office/drawing/2014/main" xmlns="" id="{9614727F-E6ED-474F-80C1-1AA9A1F473B9}"/>
               </a:ext>
             </a:extLst>
           </p:cNvPr>
@@ -31776,7 +31809,7 @@
           <p:cNvPr id="14" name="TextBox 13">
             <a:extLst>
               <a:ext uri="{FF2B5EF4-FFF2-40B4-BE49-F238E27FC236}">
-                <a16:creationId xmlns="" xmlns:a16="http://schemas.microsoft.com/office/drawing/2014/main" id="{9614727F-E6ED-474F-80C1-1AA9A1F473B9}"/>
+                <a16:creationId xmlns:a16="http://schemas.microsoft.com/office/drawing/2014/main" xmlns="" id="{9614727F-E6ED-474F-80C1-1AA9A1F473B9}"/>
               </a:ext>
             </a:extLst>
           </p:cNvPr>
@@ -31832,7 +31865,7 @@
           <p:cNvPr id="15" name="TextBox 14">
             <a:extLst>
               <a:ext uri="{FF2B5EF4-FFF2-40B4-BE49-F238E27FC236}">
-                <a16:creationId xmlns="" xmlns:a16="http://schemas.microsoft.com/office/drawing/2014/main" id="{9614727F-E6ED-474F-80C1-1AA9A1F473B9}"/>
+                <a16:creationId xmlns:a16="http://schemas.microsoft.com/office/drawing/2014/main" xmlns="" id="{9614727F-E6ED-474F-80C1-1AA9A1F473B9}"/>
               </a:ext>
             </a:extLst>
           </p:cNvPr>
@@ -32986,7 +33019,7 @@
   <a:extraClrSchemeLst/>
   <a:extLst>
     <a:ext uri="{05A4C25C-085E-4340-85A3-A5531E510DB2}">
-      <thm15:themeFamily xmlns="" xmlns:thm15="http://schemas.microsoft.com/office/thememl/2012/main" name="Office Theme" id="{62F939B6-93AF-4DB8-9C6B-D6C7DFDC589F}" vid="{4A3C46E8-61CC-4603-A589-7422A47A8E4A}"/>
+      <thm15:themeFamily xmlns:thm15="http://schemas.microsoft.com/office/thememl/2012/main" xmlns="" name="Office Theme" id="{62F939B6-93AF-4DB8-9C6B-D6C7DFDC589F}" vid="{4A3C46E8-61CC-4603-A589-7422A47A8E4A}"/>
     </a:ext>
   </a:extLst>
 </a:theme>
@@ -33281,7 +33314,7 @@
   <a:extraClrSchemeLst/>
   <a:extLst>
     <a:ext uri="{05A4C25C-085E-4340-85A3-A5531E510DB2}">
-      <thm15:themeFamily xmlns="" xmlns:thm15="http://schemas.microsoft.com/office/thememl/2012/main" name="Office Theme" id="{62F939B6-93AF-4DB8-9C6B-D6C7DFDC589F}" vid="{4A3C46E8-61CC-4603-A589-7422A47A8E4A}"/>
+      <thm15:themeFamily xmlns:thm15="http://schemas.microsoft.com/office/thememl/2012/main" xmlns="" name="Office Theme" id="{62F939B6-93AF-4DB8-9C6B-D6C7DFDC589F}" vid="{4A3C46E8-61CC-4603-A589-7422A47A8E4A}"/>
     </a:ext>
   </a:extLst>
 </a:theme>
@@ -33542,7 +33575,7 @@
   <a:extraClrSchemeLst/>
   <a:extLst>
     <a:ext uri="{05A4C25C-085E-4340-85A3-A5531E510DB2}">
-      <thm15:themeFamily xmlns="" xmlns:thm15="http://schemas.microsoft.com/office/thememl/2012/main" name="Office Theme" id="{62F939B6-93AF-4DB8-9C6B-D6C7DFDC589F}" vid="{4A3C46E8-61CC-4603-A589-7422A47A8E4A}"/>
+      <thm15:themeFamily xmlns:thm15="http://schemas.microsoft.com/office/thememl/2012/main" xmlns="" name="Office Theme" id="{62F939B6-93AF-4DB8-9C6B-D6C7DFDC589F}" vid="{4A3C46E8-61CC-4603-A589-7422A47A8E4A}"/>
     </a:ext>
   </a:extLst>
 </a:theme>

</xml_diff>